<commit_message>
thesis presentation final version
</commit_message>
<xml_diff>
--- a/egs/smarthome/doc/presentation/main.pptx
+++ b/egs/smarthome/doc/presentation/main.pptx
@@ -9,17 +9,15 @@
     <p:sldId id="257" r:id="rId3"/>
     <p:sldId id="258" r:id="rId4"/>
     <p:sldId id="263" r:id="rId5"/>
-    <p:sldId id="266" r:id="rId6"/>
-    <p:sldId id="259" r:id="rId7"/>
-    <p:sldId id="267" r:id="rId8"/>
-    <p:sldId id="260" r:id="rId9"/>
-    <p:sldId id="271" r:id="rId10"/>
-    <p:sldId id="275" r:id="rId11"/>
-    <p:sldId id="274" r:id="rId12"/>
-    <p:sldId id="277" r:id="rId13"/>
-    <p:sldId id="278" r:id="rId14"/>
-    <p:sldId id="279" r:id="rId15"/>
-    <p:sldId id="262" r:id="rId16"/>
+    <p:sldId id="259" r:id="rId6"/>
+    <p:sldId id="267" r:id="rId7"/>
+    <p:sldId id="260" r:id="rId8"/>
+    <p:sldId id="275" r:id="rId9"/>
+    <p:sldId id="277" r:id="rId10"/>
+    <p:sldId id="274" r:id="rId11"/>
+    <p:sldId id="278" r:id="rId12"/>
+    <p:sldId id="279" r:id="rId13"/>
+    <p:sldId id="280" r:id="rId14"/>
   </p:sldIdLst>
   <p:sldSz cx="12192000" cy="6858000"/>
   <p:notesSz cx="6858000" cy="9144000"/>
@@ -273,7 +271,7 @@
           <a:p>
             <a:fld id="{08F2E7AC-5882-D64D-9A4F-B2618F63BE7B}" type="datetimeFigureOut">
               <a:rPr lang="cs-CZ" smtClean="0"/>
-              <a:t>14.06.2020</a:t>
+              <a:t>15.06.2020</a:t>
             </a:fld>
             <a:endParaRPr lang="cs-CZ"/>
           </a:p>
@@ -471,7 +469,7 @@
           <a:p>
             <a:fld id="{08F2E7AC-5882-D64D-9A4F-B2618F63BE7B}" type="datetimeFigureOut">
               <a:rPr lang="cs-CZ" smtClean="0"/>
-              <a:t>14.06.2020</a:t>
+              <a:t>15.06.2020</a:t>
             </a:fld>
             <a:endParaRPr lang="cs-CZ"/>
           </a:p>
@@ -679,7 +677,7 @@
           <a:p>
             <a:fld id="{08F2E7AC-5882-D64D-9A4F-B2618F63BE7B}" type="datetimeFigureOut">
               <a:rPr lang="cs-CZ" smtClean="0"/>
-              <a:t>14.06.2020</a:t>
+              <a:t>15.06.2020</a:t>
             </a:fld>
             <a:endParaRPr lang="cs-CZ"/>
           </a:p>
@@ -877,7 +875,7 @@
           <a:p>
             <a:fld id="{08F2E7AC-5882-D64D-9A4F-B2618F63BE7B}" type="datetimeFigureOut">
               <a:rPr lang="cs-CZ" smtClean="0"/>
-              <a:t>14.06.2020</a:t>
+              <a:t>15.06.2020</a:t>
             </a:fld>
             <a:endParaRPr lang="cs-CZ"/>
           </a:p>
@@ -1152,7 +1150,7 @@
           <a:p>
             <a:fld id="{08F2E7AC-5882-D64D-9A4F-B2618F63BE7B}" type="datetimeFigureOut">
               <a:rPr lang="cs-CZ" smtClean="0"/>
-              <a:t>14.06.2020</a:t>
+              <a:t>15.06.2020</a:t>
             </a:fld>
             <a:endParaRPr lang="cs-CZ"/>
           </a:p>
@@ -1417,7 +1415,7 @@
           <a:p>
             <a:fld id="{08F2E7AC-5882-D64D-9A4F-B2618F63BE7B}" type="datetimeFigureOut">
               <a:rPr lang="cs-CZ" smtClean="0"/>
-              <a:t>14.06.2020</a:t>
+              <a:t>15.06.2020</a:t>
             </a:fld>
             <a:endParaRPr lang="cs-CZ"/>
           </a:p>
@@ -1829,7 +1827,7 @@
           <a:p>
             <a:fld id="{08F2E7AC-5882-D64D-9A4F-B2618F63BE7B}" type="datetimeFigureOut">
               <a:rPr lang="cs-CZ" smtClean="0"/>
-              <a:t>14.06.2020</a:t>
+              <a:t>15.06.2020</a:t>
             </a:fld>
             <a:endParaRPr lang="cs-CZ"/>
           </a:p>
@@ -1970,7 +1968,7 @@
           <a:p>
             <a:fld id="{08F2E7AC-5882-D64D-9A4F-B2618F63BE7B}" type="datetimeFigureOut">
               <a:rPr lang="cs-CZ" smtClean="0"/>
-              <a:t>14.06.2020</a:t>
+              <a:t>15.06.2020</a:t>
             </a:fld>
             <a:endParaRPr lang="cs-CZ"/>
           </a:p>
@@ -2083,7 +2081,7 @@
           <a:p>
             <a:fld id="{08F2E7AC-5882-D64D-9A4F-B2618F63BE7B}" type="datetimeFigureOut">
               <a:rPr lang="cs-CZ" smtClean="0"/>
-              <a:t>14.06.2020</a:t>
+              <a:t>15.06.2020</a:t>
             </a:fld>
             <a:endParaRPr lang="cs-CZ"/>
           </a:p>
@@ -2394,7 +2392,7 @@
           <a:p>
             <a:fld id="{08F2E7AC-5882-D64D-9A4F-B2618F63BE7B}" type="datetimeFigureOut">
               <a:rPr lang="cs-CZ" smtClean="0"/>
-              <a:t>14.06.2020</a:t>
+              <a:t>15.06.2020</a:t>
             </a:fld>
             <a:endParaRPr lang="cs-CZ"/>
           </a:p>
@@ -2682,7 +2680,7 @@
           <a:p>
             <a:fld id="{08F2E7AC-5882-D64D-9A4F-B2618F63BE7B}" type="datetimeFigureOut">
               <a:rPr lang="cs-CZ" smtClean="0"/>
-              <a:t>14.06.2020</a:t>
+              <a:t>15.06.2020</a:t>
             </a:fld>
             <a:endParaRPr lang="cs-CZ"/>
           </a:p>
@@ -2923,7 +2921,7 @@
           <a:p>
             <a:fld id="{08F2E7AC-5882-D64D-9A4F-B2618F63BE7B}" type="datetimeFigureOut">
               <a:rPr lang="cs-CZ" smtClean="0"/>
-              <a:t>14.06.2020</a:t>
+              <a:t>15.06.2020</a:t>
             </a:fld>
             <a:endParaRPr lang="cs-CZ"/>
           </a:p>
@@ -4010,7 +4008,7 @@
             <a:pPr algn="ctr"/>
             <a:r>
               <a:rPr lang="cs-CZ" dirty="0"/>
-              <a:t>SYSTÉM DIAGNOSTIKY KOMUNIKACE</a:t>
+              <a:t>KLASIFIKACE ČASU NEPERIODICKÝCH ZPRÁV</a:t>
             </a:r>
           </a:p>
         </p:txBody>
@@ -4060,10 +4058,10 @@
       </p:cxnSp>
       <p:pic>
         <p:nvPicPr>
-          <p:cNvPr id="6" name="Zástupný obsah 6" descr="Obsah obrázku snímek obrazovky&#10;&#10;Popis byl vytvořen automaticky">
-            <a:extLst>
-              <a:ext uri="{FF2B5EF4-FFF2-40B4-BE49-F238E27FC236}">
-                <a16:creationId xmlns:a16="http://schemas.microsoft.com/office/drawing/2014/main" id="{AD8BF727-9B91-F049-AD04-0C2CC99BF365}"/>
+          <p:cNvPr id="7" name="Zástupný obsah 7" descr="Obsah obrázku text&#10;&#10;Popis byl vytvořen automaticky">
+            <a:extLst>
+              <a:ext uri="{FF2B5EF4-FFF2-40B4-BE49-F238E27FC236}">
+                <a16:creationId xmlns:a16="http://schemas.microsoft.com/office/drawing/2014/main" id="{97C1BF5C-DCCD-0548-BDCC-5AA150A37755}"/>
               </a:ext>
             </a:extLst>
           </p:cNvPr>
@@ -4082,15 +4080,45 @@
         </p:blipFill>
         <p:spPr>
           <a:xfrm>
-            <a:off x="1570537" y="1568391"/>
-            <a:ext cx="9050925" cy="4722686"/>
-          </a:xfrm>
+            <a:off x="2839339" y="1343962"/>
+            <a:ext cx="6354190" cy="2541676"/>
+          </a:xfrm>
+        </p:spPr>
+      </p:pic>
+      <p:pic>
+        <p:nvPicPr>
+          <p:cNvPr id="8" name="Obrázek 7">
+            <a:extLst>
+              <a:ext uri="{FF2B5EF4-FFF2-40B4-BE49-F238E27FC236}">
+                <a16:creationId xmlns:a16="http://schemas.microsoft.com/office/drawing/2014/main" id="{173413F4-BC97-F94F-9D32-EBBFF5BBAAE6}"/>
+              </a:ext>
+            </a:extLst>
+          </p:cNvPr>
+          <p:cNvPicPr>
+            <a:picLocks noChangeAspect="1"/>
+          </p:cNvPicPr>
+          <p:nvPr/>
+        </p:nvPicPr>
+        <p:blipFill>
+          <a:blip r:embed="rId3"/>
+          <a:stretch>
+            <a:fillRect/>
+          </a:stretch>
+        </p:blipFill>
+        <p:spPr>
+          <a:xfrm>
+            <a:off x="2823732" y="4017270"/>
+            <a:ext cx="6369797" cy="2547919"/>
+          </a:xfrm>
+          <a:prstGeom prst="rect">
+            <a:avLst/>
+          </a:prstGeom>
         </p:spPr>
       </p:pic>
     </p:spTree>
     <p:extLst>
       <p:ext uri="{BB962C8B-B14F-4D97-AF65-F5344CB8AC3E}">
-        <p14:creationId xmlns:p14="http://schemas.microsoft.com/office/powerpoint/2010/main" val="2372935630"/>
+        <p14:creationId xmlns:p14="http://schemas.microsoft.com/office/powerpoint/2010/main" val="783283805"/>
       </p:ext>
     </p:extLst>
   </p:cSld>
@@ -4146,7 +4174,7 @@
             <a:pPr algn="ctr"/>
             <a:r>
               <a:rPr lang="cs-CZ" dirty="0"/>
-              <a:t>KLASIFIKACE ČASU NEPERIODICKÝCH ZPRÁV</a:t>
+              <a:t>WEBOVÁ VIZUALIZACE</a:t>
             </a:r>
           </a:p>
         </p:txBody>
@@ -4196,19 +4224,17 @@
       </p:cxnSp>
       <p:pic>
         <p:nvPicPr>
-          <p:cNvPr id="7" name="Zástupný obsah 7" descr="Obsah obrázku text&#10;&#10;Popis byl vytvořen automaticky">
-            <a:extLst>
-              <a:ext uri="{FF2B5EF4-FFF2-40B4-BE49-F238E27FC236}">
-                <a16:creationId xmlns:a16="http://schemas.microsoft.com/office/drawing/2014/main" id="{97C1BF5C-DCCD-0548-BDCC-5AA150A37755}"/>
+          <p:cNvPr id="11" name="Obrázek 10" descr="Obsah obrázku text, ukazatel skóre, monitor, exteriér&#10;&#10;Popis byl vytvořen automaticky">
+            <a:extLst>
+              <a:ext uri="{FF2B5EF4-FFF2-40B4-BE49-F238E27FC236}">
+                <a16:creationId xmlns:a16="http://schemas.microsoft.com/office/drawing/2014/main" id="{E03FE163-DF53-6648-9608-5895DFF6B62E}"/>
               </a:ext>
             </a:extLst>
           </p:cNvPr>
           <p:cNvPicPr>
-            <a:picLocks noGrp="1" noChangeAspect="1"/>
+            <a:picLocks noChangeAspect="1"/>
           </p:cNvPicPr>
-          <p:nvPr>
-            <p:ph idx="1"/>
-          </p:nvPr>
+          <p:nvPr/>
         </p:nvPicPr>
         <p:blipFill>
           <a:blip r:embed="rId2"/>
@@ -4218,17 +4244,20 @@
         </p:blipFill>
         <p:spPr>
           <a:xfrm>
-            <a:off x="2839339" y="1343962"/>
-            <a:ext cx="6354190" cy="2541676"/>
-          </a:xfrm>
+            <a:off x="1413526" y="1154304"/>
+            <a:ext cx="5468225" cy="5502703"/>
+          </a:xfrm>
+          <a:prstGeom prst="rect">
+            <a:avLst/>
+          </a:prstGeom>
         </p:spPr>
       </p:pic>
       <p:pic>
         <p:nvPicPr>
-          <p:cNvPr id="8" name="Obrázek 7">
-            <a:extLst>
-              <a:ext uri="{FF2B5EF4-FFF2-40B4-BE49-F238E27FC236}">
-                <a16:creationId xmlns:a16="http://schemas.microsoft.com/office/drawing/2014/main" id="{173413F4-BC97-F94F-9D32-EBBFF5BBAAE6}"/>
+          <p:cNvPr id="4" name="Obrázek 3" descr="Obsah obrázku snímek obrazovky, kreslení&#10;&#10;Popis byl vytvořen automaticky">
+            <a:extLst>
+              <a:ext uri="{FF2B5EF4-FFF2-40B4-BE49-F238E27FC236}">
+                <a16:creationId xmlns:a16="http://schemas.microsoft.com/office/drawing/2014/main" id="{40DE8156-B7C8-2B4F-B4EB-978EEBBA4D9D}"/>
               </a:ext>
             </a:extLst>
           </p:cNvPr>
@@ -4245,18 +4274,97 @@
         </p:blipFill>
         <p:spPr>
           <a:xfrm>
-            <a:off x="2823732" y="4017270"/>
-            <a:ext cx="6369797" cy="2547919"/>
+            <a:off x="8777841" y="3364217"/>
+            <a:ext cx="2633360" cy="1082878"/>
           </a:xfrm>
           <a:prstGeom prst="rect">
             <a:avLst/>
           </a:prstGeom>
         </p:spPr>
       </p:pic>
+      <p:sp>
+        <p:nvSpPr>
+          <p:cNvPr id="14" name="TextovéPole 13">
+            <a:extLst>
+              <a:ext uri="{FF2B5EF4-FFF2-40B4-BE49-F238E27FC236}">
+                <a16:creationId xmlns:a16="http://schemas.microsoft.com/office/drawing/2014/main" id="{860F9B76-441F-2C4C-984B-B7DB0DA9771B}"/>
+              </a:ext>
+            </a:extLst>
+          </p:cNvPr>
+          <p:cNvSpPr txBox="1"/>
+          <p:nvPr/>
+        </p:nvSpPr>
+        <p:spPr>
+          <a:xfrm>
+            <a:off x="7064549" y="3536323"/>
+            <a:ext cx="1509709" cy="369332"/>
+          </a:xfrm>
+          <a:prstGeom prst="rect">
+            <a:avLst/>
+          </a:prstGeom>
+          <a:noFill/>
+        </p:spPr>
+        <p:txBody>
+          <a:bodyPr wrap="none" rtlCol="0">
+            <a:spAutoFit/>
+          </a:bodyPr>
+          <a:lstStyle/>
+          <a:p>
+            <a:r>
+              <a:rPr lang="cs-CZ" dirty="0"/>
+              <a:t>Sensor ERROR</a:t>
+            </a:r>
+          </a:p>
+        </p:txBody>
+      </p:sp>
+      <p:cxnSp>
+        <p:nvCxnSpPr>
+          <p:cNvPr id="15" name="Přímá spojovací šipka 14">
+            <a:extLst>
+              <a:ext uri="{FF2B5EF4-FFF2-40B4-BE49-F238E27FC236}">
+                <a16:creationId xmlns:a16="http://schemas.microsoft.com/office/drawing/2014/main" id="{E8BD43D5-241A-4749-8283-F60DCB208DBA}"/>
+              </a:ext>
+            </a:extLst>
+          </p:cNvPr>
+          <p:cNvCxnSpPr>
+            <a:cxnSpLocks/>
+          </p:cNvCxnSpPr>
+          <p:nvPr/>
+        </p:nvCxnSpPr>
+        <p:spPr>
+          <a:xfrm>
+            <a:off x="7012379" y="3911594"/>
+            <a:ext cx="1644733" cy="0"/>
+          </a:xfrm>
+          <a:prstGeom prst="straightConnector1">
+            <a:avLst/>
+          </a:prstGeom>
+          <a:ln w="15875">
+            <a:solidFill>
+              <a:schemeClr val="tx1"/>
+            </a:solidFill>
+            <a:tailEnd type="triangle"/>
+          </a:ln>
+        </p:spPr>
+        <p:style>
+          <a:lnRef idx="1">
+            <a:schemeClr val="accent1"/>
+          </a:lnRef>
+          <a:fillRef idx="0">
+            <a:schemeClr val="accent1"/>
+          </a:fillRef>
+          <a:effectRef idx="0">
+            <a:schemeClr val="accent1"/>
+          </a:effectRef>
+          <a:fontRef idx="minor">
+            <a:schemeClr val="tx1"/>
+          </a:fontRef>
+        </p:style>
+      </p:cxnSp>
     </p:spTree>
     <p:extLst>
       <p:ext uri="{BB962C8B-B14F-4D97-AF65-F5344CB8AC3E}">
-        <p14:creationId xmlns:p14="http://schemas.microsoft.com/office/powerpoint/2010/main" val="783283805"/>
+        <p14:creationId xmlns:p14="http://schemas.microsoft.com/office/powerpoint/2010/main" val="2813166264"/>
       </p:ext>
     </p:extLst>
   </p:cSld>
@@ -4312,7 +4420,7 @@
             <a:pPr algn="ctr"/>
             <a:r>
               <a:rPr lang="cs-CZ" dirty="0"/>
-              <a:t>KLASIFIKACE HODNOT V DANÉM ČASE</a:t>
+              <a:t>WEBOVÁ VIZUALIZACE</a:t>
             </a:r>
           </a:p>
         </p:txBody>
@@ -4362,19 +4470,17 @@
       </p:cxnSp>
       <p:pic>
         <p:nvPicPr>
-          <p:cNvPr id="9" name="Zástupný obsah 6">
-            <a:extLst>
-              <a:ext uri="{FF2B5EF4-FFF2-40B4-BE49-F238E27FC236}">
-                <a16:creationId xmlns:a16="http://schemas.microsoft.com/office/drawing/2014/main" id="{DD88D5C6-313A-8C4E-8EB8-372596E870EF}"/>
+          <p:cNvPr id="7" name="Obrázek 6" descr="Obsah obrázku snímek obrazovky&#10;&#10;Popis byl vytvořen automaticky">
+            <a:extLst>
+              <a:ext uri="{FF2B5EF4-FFF2-40B4-BE49-F238E27FC236}">
+                <a16:creationId xmlns:a16="http://schemas.microsoft.com/office/drawing/2014/main" id="{A98F80F5-C6A5-0947-B8B3-C82037B700A6}"/>
               </a:ext>
             </a:extLst>
           </p:cNvPr>
           <p:cNvPicPr>
-            <a:picLocks noGrp="1" noChangeAspect="1"/>
+            <a:picLocks noChangeAspect="1"/>
           </p:cNvPicPr>
-          <p:nvPr>
-            <p:ph idx="1"/>
-          </p:nvPr>
+          <p:nvPr/>
         </p:nvPicPr>
         <p:blipFill>
           <a:blip r:embed="rId2"/>
@@ -4384,17 +4490,20 @@
         </p:blipFill>
         <p:spPr>
           <a:xfrm>
-            <a:off x="349435" y="1655358"/>
-            <a:ext cx="5624999" cy="4500000"/>
-          </a:xfrm>
+            <a:off x="6303152" y="1343962"/>
+            <a:ext cx="5501012" cy="5220000"/>
+          </a:xfrm>
+          <a:prstGeom prst="rect">
+            <a:avLst/>
+          </a:prstGeom>
         </p:spPr>
       </p:pic>
       <p:pic>
         <p:nvPicPr>
-          <p:cNvPr id="10" name="Obrázek 9" descr="Obsah obrázku snímek obrazovky&#10;&#10;Popis byl vytvořen automaticky">
-            <a:extLst>
-              <a:ext uri="{FF2B5EF4-FFF2-40B4-BE49-F238E27FC236}">
-                <a16:creationId xmlns:a16="http://schemas.microsoft.com/office/drawing/2014/main" id="{4DA9AF51-A7EF-3848-A9F3-EE8DE1DEC437}"/>
+          <p:cNvPr id="6" name="Obrázek 5" descr="Obsah obrázku snímek obrazovky, monitor, obrazovka, černá&#10;&#10;Popis byl vytvořen automaticky">
+            <a:extLst>
+              <a:ext uri="{FF2B5EF4-FFF2-40B4-BE49-F238E27FC236}">
+                <a16:creationId xmlns:a16="http://schemas.microsoft.com/office/drawing/2014/main" id="{610D4C5C-F83B-D543-B831-F98EF5059EE4}"/>
               </a:ext>
             </a:extLst>
           </p:cNvPr>
@@ -4411,8 +4520,8 @@
         </p:blipFill>
         <p:spPr>
           <a:xfrm>
-            <a:off x="6350349" y="1655358"/>
-            <a:ext cx="5625000" cy="4500000"/>
+            <a:off x="545788" y="1343962"/>
+            <a:ext cx="5307000" cy="5220000"/>
           </a:xfrm>
           <a:prstGeom prst="rect">
             <a:avLst/>
@@ -4422,7 +4531,7 @@
     </p:spTree>
     <p:extLst>
       <p:ext uri="{BB962C8B-B14F-4D97-AF65-F5344CB8AC3E}">
-        <p14:creationId xmlns:p14="http://schemas.microsoft.com/office/powerpoint/2010/main" val="749297666"/>
+        <p14:creationId xmlns:p14="http://schemas.microsoft.com/office/powerpoint/2010/main" val="661249694"/>
       </p:ext>
     </p:extLst>
   </p:cSld>
@@ -4454,340 +4563,6 @@
           <p:cNvPr id="2" name="Nadpis 1">
             <a:extLst>
               <a:ext uri="{FF2B5EF4-FFF2-40B4-BE49-F238E27FC236}">
-                <a16:creationId xmlns:a16="http://schemas.microsoft.com/office/drawing/2014/main" id="{4CAAA1D4-2E14-2E41-AB9C-B45414F8D182}"/>
-              </a:ext>
-            </a:extLst>
-          </p:cNvPr>
-          <p:cNvSpPr>
-            <a:spLocks noGrp="1"/>
-          </p:cNvSpPr>
-          <p:nvPr>
-            <p:ph type="title"/>
-          </p:nvPr>
-        </p:nvSpPr>
-        <p:spPr>
-          <a:xfrm>
-            <a:off x="838200" y="18399"/>
-            <a:ext cx="10515600" cy="1325563"/>
-          </a:xfrm>
-        </p:spPr>
-        <p:txBody>
-          <a:bodyPr/>
-          <a:lstStyle/>
-          <a:p>
-            <a:pPr algn="ctr"/>
-            <a:r>
-              <a:rPr lang="cs-CZ" dirty="0"/>
-              <a:t>WEBOVÁ VIZUALIZACE</a:t>
-            </a:r>
-          </a:p>
-        </p:txBody>
-      </p:sp>
-      <p:cxnSp>
-        <p:nvCxnSpPr>
-          <p:cNvPr id="5" name="Přímá spojnice 4">
-            <a:extLst>
-              <a:ext uri="{FF2B5EF4-FFF2-40B4-BE49-F238E27FC236}">
-                <a16:creationId xmlns:a16="http://schemas.microsoft.com/office/drawing/2014/main" id="{4F328FDC-C684-044E-B8A8-CC25703677FD}"/>
-              </a:ext>
-            </a:extLst>
-          </p:cNvPr>
-          <p:cNvCxnSpPr>
-            <a:cxnSpLocks/>
-          </p:cNvCxnSpPr>
-          <p:nvPr/>
-        </p:nvCxnSpPr>
-        <p:spPr>
-          <a:xfrm>
-            <a:off x="910225" y="984508"/>
-            <a:ext cx="10371550" cy="0"/>
-          </a:xfrm>
-          <a:prstGeom prst="line">
-            <a:avLst/>
-          </a:prstGeom>
-          <a:ln w="15875">
-            <a:solidFill>
-              <a:schemeClr val="tx1"/>
-            </a:solidFill>
-          </a:ln>
-        </p:spPr>
-        <p:style>
-          <a:lnRef idx="1">
-            <a:schemeClr val="accent1"/>
-          </a:lnRef>
-          <a:fillRef idx="0">
-            <a:schemeClr val="accent1"/>
-          </a:fillRef>
-          <a:effectRef idx="0">
-            <a:schemeClr val="accent1"/>
-          </a:effectRef>
-          <a:fontRef idx="minor">
-            <a:schemeClr val="tx1"/>
-          </a:fontRef>
-        </p:style>
-      </p:cxnSp>
-      <p:pic>
-        <p:nvPicPr>
-          <p:cNvPr id="11" name="Obrázek 10" descr="Obsah obrázku text, ukazatel skóre, monitor, exteriér&#10;&#10;Popis byl vytvořen automaticky">
-            <a:extLst>
-              <a:ext uri="{FF2B5EF4-FFF2-40B4-BE49-F238E27FC236}">
-                <a16:creationId xmlns:a16="http://schemas.microsoft.com/office/drawing/2014/main" id="{E03FE163-DF53-6648-9608-5895DFF6B62E}"/>
-              </a:ext>
-            </a:extLst>
-          </p:cNvPr>
-          <p:cNvPicPr>
-            <a:picLocks noChangeAspect="1"/>
-          </p:cNvPicPr>
-          <p:nvPr/>
-        </p:nvPicPr>
-        <p:blipFill>
-          <a:blip r:embed="rId2"/>
-          <a:stretch>
-            <a:fillRect/>
-          </a:stretch>
-        </p:blipFill>
-        <p:spPr>
-          <a:xfrm>
-            <a:off x="481313" y="1271961"/>
-            <a:ext cx="5187293" cy="5220000"/>
-          </a:xfrm>
-          <a:prstGeom prst="rect">
-            <a:avLst/>
-          </a:prstGeom>
-        </p:spPr>
-      </p:pic>
-      <p:pic>
-        <p:nvPicPr>
-          <p:cNvPr id="13" name="Obrázek 12" descr="Obsah obrázku snímek obrazovky, monitor, obrazovka, černá&#10;&#10;Popis byl vytvořen automaticky">
-            <a:extLst>
-              <a:ext uri="{FF2B5EF4-FFF2-40B4-BE49-F238E27FC236}">
-                <a16:creationId xmlns:a16="http://schemas.microsoft.com/office/drawing/2014/main" id="{91583963-5CB8-BF4F-87E8-7026A63F640E}"/>
-              </a:ext>
-            </a:extLst>
-          </p:cNvPr>
-          <p:cNvPicPr>
-            <a:picLocks noChangeAspect="1"/>
-          </p:cNvPicPr>
-          <p:nvPr/>
-        </p:nvPicPr>
-        <p:blipFill>
-          <a:blip r:embed="rId3"/>
-          <a:stretch>
-            <a:fillRect/>
-          </a:stretch>
-        </p:blipFill>
-        <p:spPr>
-          <a:xfrm>
-            <a:off x="6204391" y="1271961"/>
-            <a:ext cx="5307000" cy="5220000"/>
-          </a:xfrm>
-          <a:prstGeom prst="rect">
-            <a:avLst/>
-          </a:prstGeom>
-        </p:spPr>
-      </p:pic>
-    </p:spTree>
-    <p:extLst>
-      <p:ext uri="{BB962C8B-B14F-4D97-AF65-F5344CB8AC3E}">
-        <p14:creationId xmlns:p14="http://schemas.microsoft.com/office/powerpoint/2010/main" val="2813166264"/>
-      </p:ext>
-    </p:extLst>
-  </p:cSld>
-  <p:clrMapOvr>
-    <a:masterClrMapping/>
-  </p:clrMapOvr>
-</p:sld>
-</file>
-
-<file path=ppt/slides/slide14.xml><?xml version="1.0" encoding="utf-8"?>
-<p:sld xmlns:a="http://schemas.openxmlformats.org/drawingml/2006/main" xmlns:r="http://schemas.openxmlformats.org/officeDocument/2006/relationships" xmlns:p="http://schemas.openxmlformats.org/presentationml/2006/main">
-  <p:cSld>
-    <p:spTree>
-      <p:nvGrpSpPr>
-        <p:cNvPr id="1" name=""/>
-        <p:cNvGrpSpPr/>
-        <p:nvPr/>
-      </p:nvGrpSpPr>
-      <p:grpSpPr>
-        <a:xfrm>
-          <a:off x="0" y="0"/>
-          <a:ext cx="0" cy="0"/>
-          <a:chOff x="0" y="0"/>
-          <a:chExt cx="0" cy="0"/>
-        </a:xfrm>
-      </p:grpSpPr>
-      <p:sp>
-        <p:nvSpPr>
-          <p:cNvPr id="2" name="Nadpis 1">
-            <a:extLst>
-              <a:ext uri="{FF2B5EF4-FFF2-40B4-BE49-F238E27FC236}">
-                <a16:creationId xmlns:a16="http://schemas.microsoft.com/office/drawing/2014/main" id="{4CAAA1D4-2E14-2E41-AB9C-B45414F8D182}"/>
-              </a:ext>
-            </a:extLst>
-          </p:cNvPr>
-          <p:cNvSpPr>
-            <a:spLocks noGrp="1"/>
-          </p:cNvSpPr>
-          <p:nvPr>
-            <p:ph type="title"/>
-          </p:nvPr>
-        </p:nvSpPr>
-        <p:spPr>
-          <a:xfrm>
-            <a:off x="838200" y="18399"/>
-            <a:ext cx="10515600" cy="1325563"/>
-          </a:xfrm>
-        </p:spPr>
-        <p:txBody>
-          <a:bodyPr/>
-          <a:lstStyle/>
-          <a:p>
-            <a:pPr algn="ctr"/>
-            <a:r>
-              <a:rPr lang="cs-CZ" dirty="0"/>
-              <a:t>WEBOVÁ VIZUALIZACE</a:t>
-            </a:r>
-          </a:p>
-        </p:txBody>
-      </p:sp>
-      <p:cxnSp>
-        <p:nvCxnSpPr>
-          <p:cNvPr id="5" name="Přímá spojnice 4">
-            <a:extLst>
-              <a:ext uri="{FF2B5EF4-FFF2-40B4-BE49-F238E27FC236}">
-                <a16:creationId xmlns:a16="http://schemas.microsoft.com/office/drawing/2014/main" id="{4F328FDC-C684-044E-B8A8-CC25703677FD}"/>
-              </a:ext>
-            </a:extLst>
-          </p:cNvPr>
-          <p:cNvCxnSpPr>
-            <a:cxnSpLocks/>
-          </p:cNvCxnSpPr>
-          <p:nvPr/>
-        </p:nvCxnSpPr>
-        <p:spPr>
-          <a:xfrm>
-            <a:off x="910225" y="984508"/>
-            <a:ext cx="10371550" cy="0"/>
-          </a:xfrm>
-          <a:prstGeom prst="line">
-            <a:avLst/>
-          </a:prstGeom>
-          <a:ln w="15875">
-            <a:solidFill>
-              <a:schemeClr val="tx1"/>
-            </a:solidFill>
-          </a:ln>
-        </p:spPr>
-        <p:style>
-          <a:lnRef idx="1">
-            <a:schemeClr val="accent1"/>
-          </a:lnRef>
-          <a:fillRef idx="0">
-            <a:schemeClr val="accent1"/>
-          </a:fillRef>
-          <a:effectRef idx="0">
-            <a:schemeClr val="accent1"/>
-          </a:effectRef>
-          <a:fontRef idx="minor">
-            <a:schemeClr val="tx1"/>
-          </a:fontRef>
-        </p:style>
-      </p:cxnSp>
-      <p:pic>
-        <p:nvPicPr>
-          <p:cNvPr id="4" name="Obrázek 3" descr="Obsah obrázku text, ukazatel skóre, monitor, černá&#10;&#10;Popis byl vytvořen automaticky">
-            <a:extLst>
-              <a:ext uri="{FF2B5EF4-FFF2-40B4-BE49-F238E27FC236}">
-                <a16:creationId xmlns:a16="http://schemas.microsoft.com/office/drawing/2014/main" id="{CE49B580-2E50-A549-9F99-3CC3814CC877}"/>
-              </a:ext>
-            </a:extLst>
-          </p:cNvPr>
-          <p:cNvPicPr>
-            <a:picLocks noChangeAspect="1"/>
-          </p:cNvPicPr>
-          <p:nvPr/>
-        </p:nvPicPr>
-        <p:blipFill>
-          <a:blip r:embed="rId2"/>
-          <a:stretch>
-            <a:fillRect/>
-          </a:stretch>
-        </p:blipFill>
-        <p:spPr>
-          <a:xfrm>
-            <a:off x="423897" y="1343962"/>
-            <a:ext cx="5464952" cy="5220000"/>
-          </a:xfrm>
-          <a:prstGeom prst="rect">
-            <a:avLst/>
-          </a:prstGeom>
-        </p:spPr>
-      </p:pic>
-      <p:pic>
-        <p:nvPicPr>
-          <p:cNvPr id="7" name="Obrázek 6" descr="Obsah obrázku snímek obrazovky&#10;&#10;Popis byl vytvořen automaticky">
-            <a:extLst>
-              <a:ext uri="{FF2B5EF4-FFF2-40B4-BE49-F238E27FC236}">
-                <a16:creationId xmlns:a16="http://schemas.microsoft.com/office/drawing/2014/main" id="{A98F80F5-C6A5-0947-B8B3-C82037B700A6}"/>
-              </a:ext>
-            </a:extLst>
-          </p:cNvPr>
-          <p:cNvPicPr>
-            <a:picLocks noChangeAspect="1"/>
-          </p:cNvPicPr>
-          <p:nvPr/>
-        </p:nvPicPr>
-        <p:blipFill>
-          <a:blip r:embed="rId3"/>
-          <a:stretch>
-            <a:fillRect/>
-          </a:stretch>
-        </p:blipFill>
-        <p:spPr>
-          <a:xfrm>
-            <a:off x="6303152" y="1343962"/>
-            <a:ext cx="5501012" cy="5220000"/>
-          </a:xfrm>
-          <a:prstGeom prst="rect">
-            <a:avLst/>
-          </a:prstGeom>
-        </p:spPr>
-      </p:pic>
-    </p:spTree>
-    <p:extLst>
-      <p:ext uri="{BB962C8B-B14F-4D97-AF65-F5344CB8AC3E}">
-        <p14:creationId xmlns:p14="http://schemas.microsoft.com/office/powerpoint/2010/main" val="661249694"/>
-      </p:ext>
-    </p:extLst>
-  </p:cSld>
-  <p:clrMapOvr>
-    <a:masterClrMapping/>
-  </p:clrMapOvr>
-</p:sld>
-</file>
-
-<file path=ppt/slides/slide15.xml><?xml version="1.0" encoding="utf-8"?>
-<p:sld xmlns:a="http://schemas.openxmlformats.org/drawingml/2006/main" xmlns:r="http://schemas.openxmlformats.org/officeDocument/2006/relationships" xmlns:p="http://schemas.openxmlformats.org/presentationml/2006/main">
-  <p:cSld>
-    <p:spTree>
-      <p:nvGrpSpPr>
-        <p:cNvPr id="1" name=""/>
-        <p:cNvGrpSpPr/>
-        <p:nvPr/>
-      </p:nvGrpSpPr>
-      <p:grpSpPr>
-        <a:xfrm>
-          <a:off x="0" y="0"/>
-          <a:ext cx="0" cy="0"/>
-          <a:chOff x="0" y="0"/>
-          <a:chExt cx="0" cy="0"/>
-        </a:xfrm>
-      </p:grpSpPr>
-      <p:sp>
-        <p:nvSpPr>
-          <p:cNvPr id="2" name="Nadpis 1">
-            <a:extLst>
-              <a:ext uri="{FF2B5EF4-FFF2-40B4-BE49-F238E27FC236}">
                 <a16:creationId xmlns:a16="http://schemas.microsoft.com/office/drawing/2014/main" id="{CE9B92FB-9733-A949-8829-22A6DC8C82C6}"/>
               </a:ext>
             </a:extLst>
@@ -4801,8 +4576,8 @@
         </p:nvSpPr>
         <p:spPr>
           <a:xfrm>
-            <a:off x="1524000" y="1187368"/>
-            <a:ext cx="9144000" cy="1810837"/>
+            <a:off x="971986" y="288279"/>
+            <a:ext cx="10246859" cy="905418"/>
           </a:xfrm>
         </p:spPr>
         <p:txBody>
@@ -4812,7 +4587,7 @@
           <a:lstStyle/>
           <a:p>
             <a:r>
-              <a:rPr lang="cs-CZ" sz="4000" dirty="0">
+              <a:rPr lang="cs-CZ" sz="2800" dirty="0">
                 <a:latin typeface="Calibri" panose="020F0502020204030204" pitchFamily="34" charset="0"/>
                 <a:cs typeface="Calibri" panose="020F0502020204030204" pitchFamily="34" charset="0"/>
               </a:rPr>
@@ -4839,7 +4614,7 @@
         </p:nvSpPr>
         <p:spPr>
           <a:xfrm>
-            <a:off x="971988" y="4919043"/>
+            <a:off x="971986" y="5320910"/>
             <a:ext cx="3487279" cy="829980"/>
           </a:xfrm>
         </p:spPr>
@@ -4880,7 +4655,7 @@
         </p:nvSpPr>
         <p:spPr>
           <a:xfrm>
-            <a:off x="7732735" y="4919043"/>
+            <a:off x="7732737" y="5320910"/>
             <a:ext cx="3487279" cy="829980"/>
           </a:xfrm>
           <a:prstGeom prst="rect">
@@ -5081,10 +4856,10 @@
       </p:sp>
       <p:cxnSp>
         <p:nvCxnSpPr>
-          <p:cNvPr id="11" name="Přímá spojnice 10">
-            <a:extLst>
-              <a:ext uri="{FF2B5EF4-FFF2-40B4-BE49-F238E27FC236}">
-                <a16:creationId xmlns:a16="http://schemas.microsoft.com/office/drawing/2014/main" id="{16FA5E05-6AB2-F242-91BD-7A8B395AB8CA}"/>
+          <p:cNvPr id="13" name="Přímá spojnice 12">
+            <a:extLst>
+              <a:ext uri="{FF2B5EF4-FFF2-40B4-BE49-F238E27FC236}">
+                <a16:creationId xmlns:a16="http://schemas.microsoft.com/office/drawing/2014/main" id="{745345BF-8AC1-F148-969B-711833533678}"/>
               </a:ext>
             </a:extLst>
           </p:cNvPr>
@@ -5095,7 +4870,7 @@
         </p:nvCxnSpPr>
         <p:spPr>
           <a:xfrm>
-            <a:off x="693081" y="1108977"/>
+            <a:off x="910225" y="1199289"/>
             <a:ext cx="10371550" cy="0"/>
           </a:xfrm>
           <a:prstGeom prst="line">
@@ -5122,53 +4897,289 @@
           </a:fontRef>
         </p:style>
       </p:cxnSp>
-      <p:cxnSp>
-        <p:nvCxnSpPr>
-          <p:cNvPr id="13" name="Přímá spojnice 12">
-            <a:extLst>
-              <a:ext uri="{FF2B5EF4-FFF2-40B4-BE49-F238E27FC236}">
-                <a16:creationId xmlns:a16="http://schemas.microsoft.com/office/drawing/2014/main" id="{745345BF-8AC1-F148-969B-711833533678}"/>
-              </a:ext>
-            </a:extLst>
-          </p:cNvPr>
-          <p:cNvCxnSpPr>
-            <a:cxnSpLocks/>
-          </p:cNvCxnSpPr>
+      <p:sp>
+        <p:nvSpPr>
+          <p:cNvPr id="4" name="TextovéPole 3">
+            <a:extLst>
+              <a:ext uri="{FF2B5EF4-FFF2-40B4-BE49-F238E27FC236}">
+                <a16:creationId xmlns:a16="http://schemas.microsoft.com/office/drawing/2014/main" id="{7041267D-2906-894D-95D1-912B726B1481}"/>
+              </a:ext>
+            </a:extLst>
+          </p:cNvPr>
+          <p:cNvSpPr txBox="1"/>
           <p:nvPr/>
-        </p:nvCxnSpPr>
-        <p:spPr>
-          <a:xfrm>
-            <a:off x="693081" y="2999821"/>
-            <a:ext cx="10371550" cy="0"/>
-          </a:xfrm>
-          <a:prstGeom prst="line">
+        </p:nvSpPr>
+        <p:spPr>
+          <a:xfrm>
+            <a:off x="1411375" y="1460677"/>
+            <a:ext cx="9751430" cy="1815882"/>
+          </a:xfrm>
+          <a:prstGeom prst="rect">
             <a:avLst/>
           </a:prstGeom>
-          <a:ln w="15875">
-            <a:solidFill>
-              <a:schemeClr val="tx1"/>
-            </a:solidFill>
-          </a:ln>
-        </p:spPr>
-        <p:style>
-          <a:lnRef idx="1">
-            <a:schemeClr val="accent1"/>
-          </a:lnRef>
-          <a:fillRef idx="0">
-            <a:schemeClr val="accent1"/>
-          </a:fillRef>
-          <a:effectRef idx="0">
-            <a:schemeClr val="accent1"/>
-          </a:effectRef>
-          <a:fontRef idx="minor">
-            <a:schemeClr val="tx1"/>
-          </a:fontRef>
-        </p:style>
-      </p:cxnSp>
+          <a:noFill/>
+        </p:spPr>
+        <p:txBody>
+          <a:bodyPr wrap="square" rtlCol="0">
+            <a:spAutoFit/>
+          </a:bodyPr>
+          <a:lstStyle/>
+          <a:p>
+            <a:r>
+              <a:rPr lang="cs-CZ" sz="2800" dirty="0"/>
+              <a:t>Zkonstruovat senzory pro chytrou domácnost</a:t>
+            </a:r>
+          </a:p>
+          <a:p>
+            <a:r>
+              <a:rPr lang="cs-CZ" sz="2800" dirty="0"/>
+              <a:t>Zajistit síťovou komunikaci a ukládání dat do databáze</a:t>
+            </a:r>
+          </a:p>
+          <a:p>
+            <a:r>
+              <a:rPr lang="cs-CZ" sz="2800" dirty="0"/>
+              <a:t>Implementovat systém detekce chyb a jiných anomálií</a:t>
+            </a:r>
+          </a:p>
+          <a:p>
+            <a:r>
+              <a:rPr lang="cs-CZ" sz="2800" dirty="0"/>
+              <a:t>Vytvořit interaktivní webové rozhraní</a:t>
+            </a:r>
+          </a:p>
+        </p:txBody>
+      </p:sp>
+      <p:sp>
+        <p:nvSpPr>
+          <p:cNvPr id="8" name="TextovéPole 7">
+            <a:extLst>
+              <a:ext uri="{FF2B5EF4-FFF2-40B4-BE49-F238E27FC236}">
+                <a16:creationId xmlns:a16="http://schemas.microsoft.com/office/drawing/2014/main" id="{0DF1E432-9852-AF48-ADB9-6C9CB801B4A2}"/>
+              </a:ext>
+            </a:extLst>
+          </p:cNvPr>
+          <p:cNvSpPr txBox="1"/>
+          <p:nvPr/>
+        </p:nvSpPr>
+        <p:spPr>
+          <a:xfrm>
+            <a:off x="1418173" y="3604291"/>
+            <a:ext cx="9751430" cy="954107"/>
+          </a:xfrm>
+          <a:prstGeom prst="rect">
+            <a:avLst/>
+          </a:prstGeom>
+          <a:noFill/>
+        </p:spPr>
+        <p:txBody>
+          <a:bodyPr wrap="square" rtlCol="0">
+            <a:spAutoFit/>
+          </a:bodyPr>
+          <a:lstStyle/>
+          <a:p>
+            <a:r>
+              <a:rPr lang="cs-CZ" sz="2800" dirty="0"/>
+              <a:t>Přidání dalších senzorů a </a:t>
+            </a:r>
+            <a:r>
+              <a:rPr lang="cs-CZ" sz="2800" dirty="0" err="1"/>
+              <a:t>aktuátorů</a:t>
+            </a:r>
+            <a:endParaRPr lang="cs-CZ" sz="2800" dirty="0"/>
+          </a:p>
+          <a:p>
+            <a:r>
+              <a:rPr lang="cs-CZ" sz="2800" dirty="0"/>
+              <a:t>Automatické přetrénování modelů</a:t>
+            </a:r>
+          </a:p>
+        </p:txBody>
+      </p:sp>
+      <p:pic>
+        <p:nvPicPr>
+          <p:cNvPr id="22" name="Obrázek 21" descr="Obsah obrázku hodiny&#10;&#10;Popis byl vytvořen automaticky">
+            <a:extLst>
+              <a:ext uri="{FF2B5EF4-FFF2-40B4-BE49-F238E27FC236}">
+                <a16:creationId xmlns:a16="http://schemas.microsoft.com/office/drawing/2014/main" id="{860FCCD1-5F6F-F743-A55E-A5EE7B73F54B}"/>
+              </a:ext>
+            </a:extLst>
+          </p:cNvPr>
+          <p:cNvPicPr>
+            <a:picLocks noChangeAspect="1"/>
+          </p:cNvPicPr>
+          <p:nvPr/>
+        </p:nvPicPr>
+        <p:blipFill>
+          <a:blip r:embed="rId2"/>
+          <a:stretch>
+            <a:fillRect/>
+          </a:stretch>
+        </p:blipFill>
+        <p:spPr>
+          <a:xfrm>
+            <a:off x="1169012" y="3739482"/>
+            <a:ext cx="251999" cy="251999"/>
+          </a:xfrm>
+          <a:prstGeom prst="rect">
+            <a:avLst/>
+          </a:prstGeom>
+        </p:spPr>
+      </p:pic>
+      <p:pic>
+        <p:nvPicPr>
+          <p:cNvPr id="23" name="Obrázek 22" descr="Obsah obrázku hodiny&#10;&#10;Popis byl vytvořen automaticky">
+            <a:extLst>
+              <a:ext uri="{FF2B5EF4-FFF2-40B4-BE49-F238E27FC236}">
+                <a16:creationId xmlns:a16="http://schemas.microsoft.com/office/drawing/2014/main" id="{CF0E55D9-2DBC-F747-B1FB-AE70005FE19E}"/>
+              </a:ext>
+            </a:extLst>
+          </p:cNvPr>
+          <p:cNvPicPr>
+            <a:picLocks noChangeAspect="1"/>
+          </p:cNvPicPr>
+          <p:nvPr/>
+        </p:nvPicPr>
+        <p:blipFill>
+          <a:blip r:embed="rId2"/>
+          <a:stretch>
+            <a:fillRect/>
+          </a:stretch>
+        </p:blipFill>
+        <p:spPr>
+          <a:xfrm>
+            <a:off x="1166173" y="4159704"/>
+            <a:ext cx="251999" cy="251999"/>
+          </a:xfrm>
+          <a:prstGeom prst="rect">
+            <a:avLst/>
+          </a:prstGeom>
+        </p:spPr>
+      </p:pic>
+      <p:pic>
+        <p:nvPicPr>
+          <p:cNvPr id="25" name="Obrázek 24" descr="Obsah obrázku hodiny&#10;&#10;Popis byl vytvořen automaticky">
+            <a:extLst>
+              <a:ext uri="{FF2B5EF4-FFF2-40B4-BE49-F238E27FC236}">
+                <a16:creationId xmlns:a16="http://schemas.microsoft.com/office/drawing/2014/main" id="{C289B1E8-1E5E-114D-9323-D71DA42814CB}"/>
+              </a:ext>
+            </a:extLst>
+          </p:cNvPr>
+          <p:cNvPicPr>
+            <a:picLocks noChangeAspect="1"/>
+          </p:cNvPicPr>
+          <p:nvPr/>
+        </p:nvPicPr>
+        <p:blipFill>
+          <a:blip r:embed="rId3"/>
+          <a:stretch>
+            <a:fillRect/>
+          </a:stretch>
+        </p:blipFill>
+        <p:spPr>
+          <a:xfrm>
+            <a:off x="1166173" y="1627822"/>
+            <a:ext cx="251999" cy="251999"/>
+          </a:xfrm>
+          <a:prstGeom prst="rect">
+            <a:avLst/>
+          </a:prstGeom>
+        </p:spPr>
+      </p:pic>
+      <p:pic>
+        <p:nvPicPr>
+          <p:cNvPr id="26" name="Obrázek 25" descr="Obsah obrázku hodiny&#10;&#10;Popis byl vytvořen automaticky">
+            <a:extLst>
+              <a:ext uri="{FF2B5EF4-FFF2-40B4-BE49-F238E27FC236}">
+                <a16:creationId xmlns:a16="http://schemas.microsoft.com/office/drawing/2014/main" id="{46FB55D3-9629-2041-996F-C790A635DF3B}"/>
+              </a:ext>
+            </a:extLst>
+          </p:cNvPr>
+          <p:cNvPicPr>
+            <a:picLocks noChangeAspect="1"/>
+          </p:cNvPicPr>
+          <p:nvPr/>
+        </p:nvPicPr>
+        <p:blipFill>
+          <a:blip r:embed="rId3"/>
+          <a:stretch>
+            <a:fillRect/>
+          </a:stretch>
+        </p:blipFill>
+        <p:spPr>
+          <a:xfrm>
+            <a:off x="1166173" y="2022793"/>
+            <a:ext cx="251999" cy="251999"/>
+          </a:xfrm>
+          <a:prstGeom prst="rect">
+            <a:avLst/>
+          </a:prstGeom>
+        </p:spPr>
+      </p:pic>
+      <p:pic>
+        <p:nvPicPr>
+          <p:cNvPr id="27" name="Obrázek 26" descr="Obsah obrázku hodiny&#10;&#10;Popis byl vytvořen automaticky">
+            <a:extLst>
+              <a:ext uri="{FF2B5EF4-FFF2-40B4-BE49-F238E27FC236}">
+                <a16:creationId xmlns:a16="http://schemas.microsoft.com/office/drawing/2014/main" id="{295B824F-446E-9942-A07F-02C4CB19FC38}"/>
+              </a:ext>
+            </a:extLst>
+          </p:cNvPr>
+          <p:cNvPicPr>
+            <a:picLocks noChangeAspect="1"/>
+          </p:cNvPicPr>
+          <p:nvPr/>
+        </p:nvPicPr>
+        <p:blipFill>
+          <a:blip r:embed="rId3"/>
+          <a:stretch>
+            <a:fillRect/>
+          </a:stretch>
+        </p:blipFill>
+        <p:spPr>
+          <a:xfrm>
+            <a:off x="1172231" y="2464061"/>
+            <a:ext cx="251999" cy="251999"/>
+          </a:xfrm>
+          <a:prstGeom prst="rect">
+            <a:avLst/>
+          </a:prstGeom>
+        </p:spPr>
+      </p:pic>
+      <p:pic>
+        <p:nvPicPr>
+          <p:cNvPr id="28" name="Obrázek 27" descr="Obsah obrázku hodiny&#10;&#10;Popis byl vytvořen automaticky">
+            <a:extLst>
+              <a:ext uri="{FF2B5EF4-FFF2-40B4-BE49-F238E27FC236}">
+                <a16:creationId xmlns:a16="http://schemas.microsoft.com/office/drawing/2014/main" id="{29184D03-F76B-B24E-80D0-D4E2C143DDD9}"/>
+              </a:ext>
+            </a:extLst>
+          </p:cNvPr>
+          <p:cNvPicPr>
+            <a:picLocks noChangeAspect="1"/>
+          </p:cNvPicPr>
+          <p:nvPr/>
+        </p:nvPicPr>
+        <p:blipFill>
+          <a:blip r:embed="rId3"/>
+          <a:stretch>
+            <a:fillRect/>
+          </a:stretch>
+        </p:blipFill>
+        <p:spPr>
+          <a:xfrm>
+            <a:off x="1172231" y="2887606"/>
+            <a:ext cx="251999" cy="251999"/>
+          </a:xfrm>
+          <a:prstGeom prst="rect">
+            <a:avLst/>
+          </a:prstGeom>
+        </p:spPr>
+      </p:pic>
     </p:spTree>
     <p:extLst>
       <p:ext uri="{BB962C8B-B14F-4D97-AF65-F5344CB8AC3E}">
-        <p14:creationId xmlns:p14="http://schemas.microsoft.com/office/powerpoint/2010/main" val="412252440"/>
+        <p14:creationId xmlns:p14="http://schemas.microsoft.com/office/powerpoint/2010/main" val="1055480196"/>
       </p:ext>
     </p:extLst>
   </p:cSld>
@@ -5857,12 +5868,7 @@
             <p:ph type="title"/>
           </p:nvPr>
         </p:nvSpPr>
-        <p:spPr>
-          <a:xfrm>
-            <a:off x="838200" y="18399"/>
-            <a:ext cx="10515600" cy="1325563"/>
-          </a:xfrm>
-        </p:spPr>
+        <p:spPr/>
         <p:txBody>
           <a:bodyPr/>
           <a:lstStyle/>
@@ -5870,8 +5876,81 @@
             <a:pPr algn="ctr"/>
             <a:r>
               <a:rPr lang="cs-CZ" dirty="0"/>
-              <a:t>ARCHITEKTURA KÓDU NA ESP8266</a:t>
-            </a:r>
+              <a:t>SÍŤOVÁ KOMUNIKACE A DATABÁZE</a:t>
+            </a:r>
+          </a:p>
+        </p:txBody>
+      </p:sp>
+      <p:sp>
+        <p:nvSpPr>
+          <p:cNvPr id="3" name="Zástupný obsah 2">
+            <a:extLst>
+              <a:ext uri="{FF2B5EF4-FFF2-40B4-BE49-F238E27FC236}">
+                <a16:creationId xmlns:a16="http://schemas.microsoft.com/office/drawing/2014/main" id="{CB624575-6CE8-8B4B-9859-540A368D9F5C}"/>
+              </a:ext>
+            </a:extLst>
+          </p:cNvPr>
+          <p:cNvSpPr>
+            <a:spLocks noGrp="1"/>
+          </p:cNvSpPr>
+          <p:nvPr>
+            <p:ph idx="1"/>
+          </p:nvPr>
+        </p:nvSpPr>
+        <p:spPr>
+          <a:xfrm>
+            <a:off x="819107" y="1825625"/>
+            <a:ext cx="4755406" cy="4411214"/>
+          </a:xfrm>
+        </p:spPr>
+        <p:txBody>
+          <a:bodyPr/>
+          <a:lstStyle/>
+          <a:p>
+            <a:r>
+              <a:rPr lang="cs-CZ" dirty="0"/>
+              <a:t>Principy sítě </a:t>
+            </a:r>
+            <a:r>
+              <a:rPr lang="cs-CZ" dirty="0" err="1"/>
+              <a:t>IoT</a:t>
+            </a:r>
+            <a:endParaRPr lang="cs-CZ" dirty="0"/>
+          </a:p>
+          <a:p>
+            <a:r>
+              <a:rPr lang="cs-CZ" dirty="0"/>
+              <a:t>Protokol MQTT</a:t>
+            </a:r>
+          </a:p>
+          <a:p>
+            <a:r>
+              <a:rPr lang="cs-CZ" dirty="0" err="1"/>
+              <a:t>Websockets</a:t>
+            </a:r>
+            <a:endParaRPr lang="cs-CZ" dirty="0"/>
+          </a:p>
+          <a:p>
+            <a:r>
+              <a:rPr lang="cs-CZ" dirty="0"/>
+              <a:t>Databáze </a:t>
+            </a:r>
+            <a:r>
+              <a:rPr lang="cs-CZ" dirty="0" err="1"/>
+              <a:t>MongoDB</a:t>
+            </a:r>
+            <a:endParaRPr lang="cs-CZ" dirty="0"/>
+          </a:p>
+          <a:p>
+            <a:r>
+              <a:rPr lang="cs-CZ" dirty="0"/>
+              <a:t>Webserver </a:t>
+            </a:r>
+            <a:r>
+              <a:rPr lang="cs-CZ" dirty="0" err="1"/>
+              <a:t>Tornado</a:t>
+            </a:r>
+            <a:endParaRPr lang="cs-CZ" dirty="0"/>
           </a:p>
         </p:txBody>
       </p:sp>
@@ -5891,7 +5970,7 @@
         </p:nvCxnSpPr>
         <p:spPr>
           <a:xfrm>
-            <a:off x="910225" y="984508"/>
+            <a:off x="982250" y="1343962"/>
             <a:ext cx="10371550" cy="0"/>
           </a:xfrm>
           <a:prstGeom prst="line">
@@ -5920,10 +5999,10 @@
       </p:cxnSp>
       <p:pic>
         <p:nvPicPr>
-          <p:cNvPr id="4" name="Obrázek 3" descr="Obsah obrázku snímek obrazovky&#10;&#10;Popis byl vytvořen automaticky">
-            <a:extLst>
-              <a:ext uri="{FF2B5EF4-FFF2-40B4-BE49-F238E27FC236}">
-                <a16:creationId xmlns:a16="http://schemas.microsoft.com/office/drawing/2014/main" id="{6182058C-B081-EC48-A98B-F40E261D2974}"/>
+          <p:cNvPr id="13" name="Obrázek 12">
+            <a:extLst>
+              <a:ext uri="{FF2B5EF4-FFF2-40B4-BE49-F238E27FC236}">
+                <a16:creationId xmlns:a16="http://schemas.microsoft.com/office/drawing/2014/main" id="{F87921E5-93E8-C84A-BB74-CB0B044179C1}"/>
               </a:ext>
             </a:extLst>
           </p:cNvPr>
@@ -5940,8 +6019,38 @@
         </p:blipFill>
         <p:spPr>
           <a:xfrm>
-            <a:off x="3340956" y="1230261"/>
-            <a:ext cx="5510088" cy="5340808"/>
+            <a:off x="6096000" y="1825625"/>
+            <a:ext cx="4484077" cy="1717306"/>
+          </a:xfrm>
+          <a:prstGeom prst="rect">
+            <a:avLst/>
+          </a:prstGeom>
+        </p:spPr>
+      </p:pic>
+      <p:pic>
+        <p:nvPicPr>
+          <p:cNvPr id="15" name="Obrázek 14" descr="Obsah obrázku snímek obrazovky&#10;&#10;Popis byl vytvořen automaticky">
+            <a:extLst>
+              <a:ext uri="{FF2B5EF4-FFF2-40B4-BE49-F238E27FC236}">
+                <a16:creationId xmlns:a16="http://schemas.microsoft.com/office/drawing/2014/main" id="{67C58C90-2230-9249-8501-848847CC369E}"/>
+              </a:ext>
+            </a:extLst>
+          </p:cNvPr>
+          <p:cNvPicPr>
+            <a:picLocks noChangeAspect="1"/>
+          </p:cNvPicPr>
+          <p:nvPr/>
+        </p:nvPicPr>
+        <p:blipFill>
+          <a:blip r:embed="rId3"/>
+          <a:stretch>
+            <a:fillRect/>
+          </a:stretch>
+        </p:blipFill>
+        <p:spPr>
+          <a:xfrm>
+            <a:off x="6782288" y="3870818"/>
+            <a:ext cx="3111500" cy="2019300"/>
           </a:xfrm>
           <a:prstGeom prst="rect">
             <a:avLst/>
@@ -5951,7 +6060,7 @@
     </p:spTree>
     <p:extLst>
       <p:ext uri="{BB962C8B-B14F-4D97-AF65-F5344CB8AC3E}">
-        <p14:creationId xmlns:p14="http://schemas.microsoft.com/office/powerpoint/2010/main" val="2491828568"/>
+        <p14:creationId xmlns:p14="http://schemas.microsoft.com/office/powerpoint/2010/main" val="2955791784"/>
       </p:ext>
     </p:extLst>
   </p:cSld>
@@ -5994,7 +6103,12 @@
             <p:ph type="title"/>
           </p:nvPr>
         </p:nvSpPr>
-        <p:spPr/>
+        <p:spPr>
+          <a:xfrm>
+            <a:off x="838200" y="18399"/>
+            <a:ext cx="10515600" cy="1325563"/>
+          </a:xfrm>
+        </p:spPr>
         <p:txBody>
           <a:bodyPr/>
           <a:lstStyle/>
@@ -6002,81 +6116,8 @@
             <a:pPr algn="ctr"/>
             <a:r>
               <a:rPr lang="cs-CZ" dirty="0"/>
-              <a:t>SÍŤOVÁ KOMUNIKACE A DATABÁZE</a:t>
-            </a:r>
-          </a:p>
-        </p:txBody>
-      </p:sp>
-      <p:sp>
-        <p:nvSpPr>
-          <p:cNvPr id="3" name="Zástupný obsah 2">
-            <a:extLst>
-              <a:ext uri="{FF2B5EF4-FFF2-40B4-BE49-F238E27FC236}">
-                <a16:creationId xmlns:a16="http://schemas.microsoft.com/office/drawing/2014/main" id="{CB624575-6CE8-8B4B-9859-540A368D9F5C}"/>
-              </a:ext>
-            </a:extLst>
-          </p:cNvPr>
-          <p:cNvSpPr>
-            <a:spLocks noGrp="1"/>
-          </p:cNvSpPr>
-          <p:nvPr>
-            <p:ph idx="1"/>
-          </p:nvPr>
-        </p:nvSpPr>
-        <p:spPr>
-          <a:xfrm>
-            <a:off x="819107" y="1825625"/>
-            <a:ext cx="4755406" cy="4411214"/>
-          </a:xfrm>
-        </p:spPr>
-        <p:txBody>
-          <a:bodyPr/>
-          <a:lstStyle/>
-          <a:p>
-            <a:r>
-              <a:rPr lang="cs-CZ" dirty="0"/>
-              <a:t>Principy sítě </a:t>
-            </a:r>
-            <a:r>
-              <a:rPr lang="cs-CZ" dirty="0" err="1"/>
-              <a:t>IoT</a:t>
-            </a:r>
-            <a:endParaRPr lang="cs-CZ" dirty="0"/>
-          </a:p>
-          <a:p>
-            <a:r>
-              <a:rPr lang="cs-CZ" dirty="0"/>
-              <a:t>Protokol MQTT</a:t>
-            </a:r>
-          </a:p>
-          <a:p>
-            <a:r>
-              <a:rPr lang="cs-CZ" dirty="0" err="1"/>
-              <a:t>Websockets</a:t>
-            </a:r>
-            <a:endParaRPr lang="cs-CZ" dirty="0"/>
-          </a:p>
-          <a:p>
-            <a:r>
-              <a:rPr lang="cs-CZ" dirty="0"/>
-              <a:t>Databáze </a:t>
-            </a:r>
-            <a:r>
-              <a:rPr lang="cs-CZ" dirty="0" err="1"/>
-              <a:t>MongoDB</a:t>
-            </a:r>
-            <a:endParaRPr lang="cs-CZ" dirty="0"/>
-          </a:p>
-          <a:p>
-            <a:r>
-              <a:rPr lang="cs-CZ" dirty="0"/>
-              <a:t>Webserver </a:t>
-            </a:r>
-            <a:r>
-              <a:rPr lang="cs-CZ" dirty="0" err="1"/>
-              <a:t>Tornado</a:t>
-            </a:r>
-            <a:endParaRPr lang="cs-CZ" dirty="0"/>
+              <a:t>DATOVÉ TOKY</a:t>
+            </a:r>
           </a:p>
         </p:txBody>
       </p:sp>
@@ -6096,7 +6137,7 @@
         </p:nvCxnSpPr>
         <p:spPr>
           <a:xfrm>
-            <a:off x="982250" y="1343962"/>
+            <a:off x="910225" y="984508"/>
             <a:ext cx="10371550" cy="0"/>
           </a:xfrm>
           <a:prstGeom prst="line">
@@ -6125,10 +6166,10 @@
       </p:cxnSp>
       <p:pic>
         <p:nvPicPr>
-          <p:cNvPr id="13" name="Obrázek 12">
-            <a:extLst>
-              <a:ext uri="{FF2B5EF4-FFF2-40B4-BE49-F238E27FC236}">
-                <a16:creationId xmlns:a16="http://schemas.microsoft.com/office/drawing/2014/main" id="{F87921E5-93E8-C84A-BB74-CB0B044179C1}"/>
+          <p:cNvPr id="6" name="Obrázek 5" descr="Obsah obrázku snímek obrazovky&#10;&#10;Popis byl vytvořen automaticky">
+            <a:extLst>
+              <a:ext uri="{FF2B5EF4-FFF2-40B4-BE49-F238E27FC236}">
+                <a16:creationId xmlns:a16="http://schemas.microsoft.com/office/drawing/2014/main" id="{DB081523-9AC9-E545-AE03-348D93D57AAE}"/>
               </a:ext>
             </a:extLst>
           </p:cNvPr>
@@ -6145,38 +6186,8 @@
         </p:blipFill>
         <p:spPr>
           <a:xfrm>
-            <a:off x="6096000" y="1825625"/>
-            <a:ext cx="4484077" cy="1717306"/>
-          </a:xfrm>
-          <a:prstGeom prst="rect">
-            <a:avLst/>
-          </a:prstGeom>
-        </p:spPr>
-      </p:pic>
-      <p:pic>
-        <p:nvPicPr>
-          <p:cNvPr id="15" name="Obrázek 14" descr="Obsah obrázku snímek obrazovky&#10;&#10;Popis byl vytvořen automaticky">
-            <a:extLst>
-              <a:ext uri="{FF2B5EF4-FFF2-40B4-BE49-F238E27FC236}">
-                <a16:creationId xmlns:a16="http://schemas.microsoft.com/office/drawing/2014/main" id="{67C58C90-2230-9249-8501-848847CC369E}"/>
-              </a:ext>
-            </a:extLst>
-          </p:cNvPr>
-          <p:cNvPicPr>
-            <a:picLocks noChangeAspect="1"/>
-          </p:cNvPicPr>
-          <p:nvPr/>
-        </p:nvPicPr>
-        <p:blipFill>
-          <a:blip r:embed="rId3"/>
-          <a:stretch>
-            <a:fillRect/>
-          </a:stretch>
-        </p:blipFill>
-        <p:spPr>
-          <a:xfrm>
-            <a:off x="6782288" y="3870818"/>
-            <a:ext cx="3111500" cy="2019300"/>
+            <a:off x="3990159" y="1110632"/>
+            <a:ext cx="4211682" cy="5529795"/>
           </a:xfrm>
           <a:prstGeom prst="rect">
             <a:avLst/>
@@ -6186,7 +6197,7 @@
     </p:spTree>
     <p:extLst>
       <p:ext uri="{BB962C8B-B14F-4D97-AF65-F5344CB8AC3E}">
-        <p14:creationId xmlns:p14="http://schemas.microsoft.com/office/powerpoint/2010/main" val="2955791784"/>
+        <p14:creationId xmlns:p14="http://schemas.microsoft.com/office/powerpoint/2010/main" val="3455403443"/>
       </p:ext>
     </p:extLst>
   </p:cSld>
@@ -6229,12 +6240,7 @@
             <p:ph type="title"/>
           </p:nvPr>
         </p:nvSpPr>
-        <p:spPr>
-          <a:xfrm>
-            <a:off x="838200" y="18399"/>
-            <a:ext cx="10515600" cy="1325563"/>
-          </a:xfrm>
-        </p:spPr>
+        <p:spPr/>
         <p:txBody>
           <a:bodyPr/>
           <a:lstStyle/>
@@ -6242,7 +6248,85 @@
             <a:pPr algn="ctr"/>
             <a:r>
               <a:rPr lang="cs-CZ" dirty="0"/>
-              <a:t>DATOVÉ TOKY</a:t>
+              <a:t>SYSTÉM DIAGNOSTIKY KOMUNIKACE</a:t>
+            </a:r>
+          </a:p>
+        </p:txBody>
+      </p:sp>
+      <p:sp>
+        <p:nvSpPr>
+          <p:cNvPr id="3" name="Zástupný obsah 2">
+            <a:extLst>
+              <a:ext uri="{FF2B5EF4-FFF2-40B4-BE49-F238E27FC236}">
+                <a16:creationId xmlns:a16="http://schemas.microsoft.com/office/drawing/2014/main" id="{CB624575-6CE8-8B4B-9859-540A368D9F5C}"/>
+              </a:ext>
+            </a:extLst>
+          </p:cNvPr>
+          <p:cNvSpPr>
+            <a:spLocks noGrp="1"/>
+          </p:cNvSpPr>
+          <p:nvPr>
+            <p:ph idx="1"/>
+          </p:nvPr>
+        </p:nvSpPr>
+        <p:spPr/>
+        <p:txBody>
+          <a:bodyPr/>
+          <a:lstStyle/>
+          <a:p>
+            <a:r>
+              <a:rPr lang="cs-CZ" dirty="0"/>
+              <a:t>Detekce chyb na úrovni ESP8266</a:t>
+            </a:r>
+          </a:p>
+          <a:p>
+            <a:r>
+              <a:rPr lang="cs-CZ" dirty="0"/>
+              <a:t>Kontrola periodicity příchozích zpráv na serveru</a:t>
+            </a:r>
+          </a:p>
+          <a:p>
+            <a:r>
+              <a:rPr lang="cs-CZ" dirty="0"/>
+              <a:t>Kontrola času a hodnot pomocí klasifikace</a:t>
+            </a:r>
+          </a:p>
+          <a:p>
+            <a:pPr lvl="1"/>
+            <a:r>
+              <a:rPr lang="cs-CZ" dirty="0"/>
+              <a:t>1D: [</a:t>
+            </a:r>
+            <a:r>
+              <a:rPr lang="cs-CZ" b="1" dirty="0" err="1"/>
+              <a:t>timestamp</a:t>
+            </a:r>
+            <a:r>
+              <a:rPr lang="cs-CZ" dirty="0"/>
+              <a:t>] (kontrola času)</a:t>
+            </a:r>
+          </a:p>
+          <a:p>
+            <a:pPr lvl="1"/>
+            <a:r>
+              <a:rPr lang="cs-CZ" dirty="0"/>
+              <a:t>2D: [</a:t>
+            </a:r>
+            <a:r>
+              <a:rPr lang="cs-CZ" b="1" dirty="0" err="1"/>
+              <a:t>timestamp</a:t>
+            </a:r>
+            <a:r>
+              <a:rPr lang="cs-CZ" dirty="0"/>
+              <a:t>, </a:t>
+            </a:r>
+            <a:r>
+              <a:rPr lang="cs-CZ" b="1" dirty="0" err="1"/>
+              <a:t>value</a:t>
+            </a:r>
+            <a:r>
+              <a:rPr lang="cs-CZ" dirty="0"/>
+              <a:t>] (kontrola hodnot v daném čase)</a:t>
             </a:r>
           </a:p>
         </p:txBody>
@@ -6263,7 +6347,7 @@
         </p:nvCxnSpPr>
         <p:spPr>
           <a:xfrm>
-            <a:off x="910225" y="984508"/>
+            <a:off x="982250" y="1343962"/>
             <a:ext cx="10371550" cy="0"/>
           </a:xfrm>
           <a:prstGeom prst="line">
@@ -6292,10 +6376,10 @@
       </p:cxnSp>
       <p:pic>
         <p:nvPicPr>
-          <p:cNvPr id="6" name="Obrázek 5" descr="Obsah obrázku snímek obrazovky&#10;&#10;Popis byl vytvořen automaticky">
-            <a:extLst>
-              <a:ext uri="{FF2B5EF4-FFF2-40B4-BE49-F238E27FC236}">
-                <a16:creationId xmlns:a16="http://schemas.microsoft.com/office/drawing/2014/main" id="{DB081523-9AC9-E545-AE03-348D93D57AAE}"/>
+          <p:cNvPr id="6" name="Obrázek 5">
+            <a:extLst>
+              <a:ext uri="{FF2B5EF4-FFF2-40B4-BE49-F238E27FC236}">
+                <a16:creationId xmlns:a16="http://schemas.microsoft.com/office/drawing/2014/main" id="{B7CEB39D-A1D5-E348-AC4C-08EB3EDCB097}"/>
               </a:ext>
             </a:extLst>
           </p:cNvPr>
@@ -6312,18 +6396,157 @@
         </p:blipFill>
         <p:spPr>
           <a:xfrm>
-            <a:off x="3990159" y="1110632"/>
-            <a:ext cx="4211682" cy="5529795"/>
+            <a:off x="7536586" y="3695428"/>
+            <a:ext cx="4074799" cy="2418496"/>
           </a:xfrm>
           <a:prstGeom prst="rect">
             <a:avLst/>
           </a:prstGeom>
         </p:spPr>
       </p:pic>
+      <p:pic>
+        <p:nvPicPr>
+          <p:cNvPr id="9" name="Obrázek 8" descr="Obsah obrázku hra&#10;&#10;Popis byl vytvořen automaticky">
+            <a:extLst>
+              <a:ext uri="{FF2B5EF4-FFF2-40B4-BE49-F238E27FC236}">
+                <a16:creationId xmlns:a16="http://schemas.microsoft.com/office/drawing/2014/main" id="{09BA64FD-5550-6F4C-938E-9DA1D013B4C9}"/>
+              </a:ext>
+            </a:extLst>
+          </p:cNvPr>
+          <p:cNvPicPr>
+            <a:picLocks noChangeAspect="1"/>
+          </p:cNvPicPr>
+          <p:nvPr/>
+        </p:nvPicPr>
+        <p:blipFill>
+          <a:blip r:embed="rId3"/>
+          <a:stretch>
+            <a:fillRect/>
+          </a:stretch>
+        </p:blipFill>
+        <p:spPr>
+          <a:xfrm>
+            <a:off x="1605738" y="4807106"/>
+            <a:ext cx="4102186" cy="1021948"/>
+          </a:xfrm>
+          <a:prstGeom prst="rect">
+            <a:avLst/>
+          </a:prstGeom>
+        </p:spPr>
+      </p:pic>
+      <p:sp>
+        <p:nvSpPr>
+          <p:cNvPr id="4" name="TextovéPole 3">
+            <a:extLst>
+              <a:ext uri="{FF2B5EF4-FFF2-40B4-BE49-F238E27FC236}">
+                <a16:creationId xmlns:a16="http://schemas.microsoft.com/office/drawing/2014/main" id="{93850877-5CB2-CA45-87C3-490C1A3B399E}"/>
+              </a:ext>
+            </a:extLst>
+          </p:cNvPr>
+          <p:cNvSpPr txBox="1"/>
+          <p:nvPr/>
+        </p:nvSpPr>
+        <p:spPr>
+          <a:xfrm>
+            <a:off x="1469172" y="5888502"/>
+            <a:ext cx="1144865" cy="369332"/>
+          </a:xfrm>
+          <a:prstGeom prst="rect">
+            <a:avLst/>
+          </a:prstGeom>
+          <a:noFill/>
+        </p:spPr>
+        <p:txBody>
+          <a:bodyPr wrap="none" rtlCol="0">
+            <a:spAutoFit/>
+          </a:bodyPr>
+          <a:lstStyle/>
+          <a:p>
+            <a:r>
+              <a:rPr lang="cs-CZ" dirty="0"/>
+              <a:t>Sensor OK</a:t>
+            </a:r>
+          </a:p>
+        </p:txBody>
+      </p:sp>
+      <p:sp>
+        <p:nvSpPr>
+          <p:cNvPr id="8" name="TextovéPole 7">
+            <a:extLst>
+              <a:ext uri="{FF2B5EF4-FFF2-40B4-BE49-F238E27FC236}">
+                <a16:creationId xmlns:a16="http://schemas.microsoft.com/office/drawing/2014/main" id="{1B5F75DB-ECC1-D74B-98D6-DAA5433FBA03}"/>
+              </a:ext>
+            </a:extLst>
+          </p:cNvPr>
+          <p:cNvSpPr txBox="1"/>
+          <p:nvPr/>
+        </p:nvSpPr>
+        <p:spPr>
+          <a:xfrm>
+            <a:off x="2957025" y="5888502"/>
+            <a:ext cx="1394292" cy="369332"/>
+          </a:xfrm>
+          <a:prstGeom prst="rect">
+            <a:avLst/>
+          </a:prstGeom>
+          <a:noFill/>
+        </p:spPr>
+        <p:txBody>
+          <a:bodyPr wrap="none" rtlCol="0">
+            <a:spAutoFit/>
+          </a:bodyPr>
+          <a:lstStyle/>
+          <a:p>
+            <a:r>
+              <a:rPr lang="cs-CZ" dirty="0" err="1"/>
+              <a:t>Value</a:t>
+            </a:r>
+            <a:r>
+              <a:rPr lang="cs-CZ" dirty="0"/>
+              <a:t> ERROR</a:t>
+            </a:r>
+          </a:p>
+        </p:txBody>
+      </p:sp>
+      <p:sp>
+        <p:nvSpPr>
+          <p:cNvPr id="10" name="TextovéPole 9">
+            <a:extLst>
+              <a:ext uri="{FF2B5EF4-FFF2-40B4-BE49-F238E27FC236}">
+                <a16:creationId xmlns:a16="http://schemas.microsoft.com/office/drawing/2014/main" id="{3EF78322-C06B-3A43-BBEA-6F59F478854F}"/>
+              </a:ext>
+            </a:extLst>
+          </p:cNvPr>
+          <p:cNvSpPr txBox="1"/>
+          <p:nvPr/>
+        </p:nvSpPr>
+        <p:spPr>
+          <a:xfrm>
+            <a:off x="4694305" y="5888502"/>
+            <a:ext cx="1509709" cy="369332"/>
+          </a:xfrm>
+          <a:prstGeom prst="rect">
+            <a:avLst/>
+          </a:prstGeom>
+          <a:noFill/>
+        </p:spPr>
+        <p:txBody>
+          <a:bodyPr wrap="none" rtlCol="0">
+            <a:spAutoFit/>
+          </a:bodyPr>
+          <a:lstStyle/>
+          <a:p>
+            <a:r>
+              <a:rPr lang="cs-CZ" dirty="0"/>
+              <a:t>Sensor ERROR</a:t>
+            </a:r>
+          </a:p>
+        </p:txBody>
+      </p:sp>
     </p:spTree>
     <p:extLst>
       <p:ext uri="{BB962C8B-B14F-4D97-AF65-F5344CB8AC3E}">
-        <p14:creationId xmlns:p14="http://schemas.microsoft.com/office/powerpoint/2010/main" val="3455403443"/>
+        <p14:creationId xmlns:p14="http://schemas.microsoft.com/office/powerpoint/2010/main" val="638294476"/>
       </p:ext>
     </p:extLst>
   </p:cSld>
@@ -6366,7 +6589,12 @@
             <p:ph type="title"/>
           </p:nvPr>
         </p:nvSpPr>
-        <p:spPr/>
+        <p:spPr>
+          <a:xfrm>
+            <a:off x="838200" y="18399"/>
+            <a:ext cx="10515600" cy="1325563"/>
+          </a:xfrm>
+        </p:spPr>
         <p:txBody>
           <a:bodyPr/>
           <a:lstStyle/>
@@ -6375,84 +6603,6 @@
             <a:r>
               <a:rPr lang="cs-CZ" dirty="0"/>
               <a:t>SYSTÉM DIAGNOSTIKY KOMUNIKACE</a:t>
-            </a:r>
-          </a:p>
-        </p:txBody>
-      </p:sp>
-      <p:sp>
-        <p:nvSpPr>
-          <p:cNvPr id="3" name="Zástupný obsah 2">
-            <a:extLst>
-              <a:ext uri="{FF2B5EF4-FFF2-40B4-BE49-F238E27FC236}">
-                <a16:creationId xmlns:a16="http://schemas.microsoft.com/office/drawing/2014/main" id="{CB624575-6CE8-8B4B-9859-540A368D9F5C}"/>
-              </a:ext>
-            </a:extLst>
-          </p:cNvPr>
-          <p:cNvSpPr>
-            <a:spLocks noGrp="1"/>
-          </p:cNvSpPr>
-          <p:nvPr>
-            <p:ph idx="1"/>
-          </p:nvPr>
-        </p:nvSpPr>
-        <p:spPr/>
-        <p:txBody>
-          <a:bodyPr/>
-          <a:lstStyle/>
-          <a:p>
-            <a:r>
-              <a:rPr lang="cs-CZ" dirty="0"/>
-              <a:t>Detekce chyb na úrovni ESP8266</a:t>
-            </a:r>
-          </a:p>
-          <a:p>
-            <a:r>
-              <a:rPr lang="cs-CZ" dirty="0"/>
-              <a:t>Kontrola periodicity příchozích zpráv na serveru</a:t>
-            </a:r>
-          </a:p>
-          <a:p>
-            <a:r>
-              <a:rPr lang="cs-CZ" dirty="0"/>
-              <a:t>Kontrola času a hodnot pomocí klasifikace</a:t>
-            </a:r>
-          </a:p>
-          <a:p>
-            <a:pPr lvl="1"/>
-            <a:r>
-              <a:rPr lang="cs-CZ" dirty="0"/>
-              <a:t>1D: [</a:t>
-            </a:r>
-            <a:r>
-              <a:rPr lang="cs-CZ" b="1" dirty="0" err="1"/>
-              <a:t>timestamp</a:t>
-            </a:r>
-            <a:r>
-              <a:rPr lang="cs-CZ" dirty="0"/>
-              <a:t>] (kontrola času)</a:t>
-            </a:r>
-          </a:p>
-          <a:p>
-            <a:pPr lvl="1"/>
-            <a:r>
-              <a:rPr lang="cs-CZ" dirty="0"/>
-              <a:t>2D: [</a:t>
-            </a:r>
-            <a:r>
-              <a:rPr lang="cs-CZ" b="1" dirty="0" err="1"/>
-              <a:t>timestamp</a:t>
-            </a:r>
-            <a:r>
-              <a:rPr lang="cs-CZ" dirty="0"/>
-              <a:t>, </a:t>
-            </a:r>
-            <a:r>
-              <a:rPr lang="cs-CZ" b="1" dirty="0" err="1"/>
-              <a:t>value</a:t>
-            </a:r>
-            <a:r>
-              <a:rPr lang="cs-CZ" dirty="0"/>
-              <a:t>] (kontrola hodnot v daném čase)</a:t>
             </a:r>
           </a:p>
         </p:txBody>
@@ -6473,7 +6623,7 @@
         </p:nvCxnSpPr>
         <p:spPr>
           <a:xfrm>
-            <a:off x="982250" y="1343962"/>
+            <a:off x="910225" y="984508"/>
             <a:ext cx="10371550" cy="0"/>
           </a:xfrm>
           <a:prstGeom prst="line">
@@ -6502,17 +6652,19 @@
       </p:cxnSp>
       <p:pic>
         <p:nvPicPr>
-          <p:cNvPr id="6" name="Obrázek 5">
-            <a:extLst>
-              <a:ext uri="{FF2B5EF4-FFF2-40B4-BE49-F238E27FC236}">
-                <a16:creationId xmlns:a16="http://schemas.microsoft.com/office/drawing/2014/main" id="{B7CEB39D-A1D5-E348-AC4C-08EB3EDCB097}"/>
+          <p:cNvPr id="6" name="Zástupný obsah 6" descr="Obsah obrázku snímek obrazovky&#10;&#10;Popis byl vytvořen automaticky">
+            <a:extLst>
+              <a:ext uri="{FF2B5EF4-FFF2-40B4-BE49-F238E27FC236}">
+                <a16:creationId xmlns:a16="http://schemas.microsoft.com/office/drawing/2014/main" id="{AD8BF727-9B91-F049-AD04-0C2CC99BF365}"/>
               </a:ext>
             </a:extLst>
           </p:cNvPr>
           <p:cNvPicPr>
-            <a:picLocks noChangeAspect="1"/>
+            <a:picLocks noGrp="1" noChangeAspect="1"/>
           </p:cNvPicPr>
-          <p:nvPr/>
+          <p:nvPr>
+            <p:ph idx="1"/>
+          </p:nvPr>
         </p:nvPicPr>
         <p:blipFill>
           <a:blip r:embed="rId2"/>
@@ -6522,48 +6674,15 @@
         </p:blipFill>
         <p:spPr>
           <a:xfrm>
-            <a:off x="7536586" y="3695428"/>
-            <a:ext cx="4074799" cy="2418496"/>
-          </a:xfrm>
-          <a:prstGeom prst="rect">
-            <a:avLst/>
-          </a:prstGeom>
-        </p:spPr>
-      </p:pic>
-      <p:pic>
-        <p:nvPicPr>
-          <p:cNvPr id="9" name="Obrázek 8" descr="Obsah obrázku hra&#10;&#10;Popis byl vytvořen automaticky">
-            <a:extLst>
-              <a:ext uri="{FF2B5EF4-FFF2-40B4-BE49-F238E27FC236}">
-                <a16:creationId xmlns:a16="http://schemas.microsoft.com/office/drawing/2014/main" id="{09BA64FD-5550-6F4C-938E-9DA1D013B4C9}"/>
-              </a:ext>
-            </a:extLst>
-          </p:cNvPr>
-          <p:cNvPicPr>
-            <a:picLocks noChangeAspect="1"/>
-          </p:cNvPicPr>
-          <p:nvPr/>
-        </p:nvPicPr>
-        <p:blipFill>
-          <a:blip r:embed="rId3"/>
-          <a:stretch>
-            <a:fillRect/>
-          </a:stretch>
-        </p:blipFill>
-        <p:spPr>
-          <a:xfrm>
-            <a:off x="2039005" y="5060098"/>
-            <a:ext cx="3239290" cy="806981"/>
-          </a:xfrm>
-          <a:prstGeom prst="rect">
-            <a:avLst/>
-          </a:prstGeom>
+            <a:off x="1570537" y="1568391"/>
+            <a:ext cx="9050925" cy="4722686"/>
+          </a:xfrm>
         </p:spPr>
       </p:pic>
     </p:spTree>
     <p:extLst>
       <p:ext uri="{BB962C8B-B14F-4D97-AF65-F5344CB8AC3E}">
-        <p14:creationId xmlns:p14="http://schemas.microsoft.com/office/powerpoint/2010/main" val="638294476"/>
+        <p14:creationId xmlns:p14="http://schemas.microsoft.com/office/powerpoint/2010/main" val="2372935630"/>
       </p:ext>
     </p:extLst>
   </p:cSld>
@@ -6606,7 +6725,12 @@
             <p:ph type="title"/>
           </p:nvPr>
         </p:nvSpPr>
-        <p:spPr/>
+        <p:spPr>
+          <a:xfrm>
+            <a:off x="838200" y="18399"/>
+            <a:ext cx="10515600" cy="1325563"/>
+          </a:xfrm>
+        </p:spPr>
         <p:txBody>
           <a:bodyPr/>
           <a:lstStyle/>
@@ -6614,11 +6738,7 @@
             <a:pPr algn="ctr"/>
             <a:r>
               <a:rPr lang="cs-CZ" dirty="0"/>
-              <a:t>KLASIFIKÁTOR </a:t>
-            </a:r>
-            <a:r>
-              <a:rPr lang="cs-CZ" i="1" dirty="0"/>
-              <a:t>ISOLATION FOREST</a:t>
+              <a:t>KLASIFIKACE HODNOT V DANÉM ČASE</a:t>
             </a:r>
           </a:p>
         </p:txBody>
@@ -6639,7 +6759,7 @@
         </p:nvCxnSpPr>
         <p:spPr>
           <a:xfrm>
-            <a:off x="982250" y="1343962"/>
+            <a:off x="910225" y="984508"/>
             <a:ext cx="10371550" cy="0"/>
           </a:xfrm>
           <a:prstGeom prst="line">
@@ -6666,560 +6786,69 @@
           </a:fontRef>
         </p:style>
       </p:cxnSp>
-      <p:sp>
-        <p:nvSpPr>
-          <p:cNvPr id="4" name="Zástupný obsah 3">
-            <a:extLst>
-              <a:ext uri="{FF2B5EF4-FFF2-40B4-BE49-F238E27FC236}">
-                <a16:creationId xmlns:a16="http://schemas.microsoft.com/office/drawing/2014/main" id="{EDC6E8C8-DD8E-1543-980C-C20C3746AA94}"/>
-              </a:ext>
-            </a:extLst>
-          </p:cNvPr>
-          <p:cNvSpPr>
-            <a:spLocks noGrp="1"/>
-          </p:cNvSpPr>
+      <p:pic>
+        <p:nvPicPr>
+          <p:cNvPr id="9" name="Zástupný obsah 6">
+            <a:extLst>
+              <a:ext uri="{FF2B5EF4-FFF2-40B4-BE49-F238E27FC236}">
+                <a16:creationId xmlns:a16="http://schemas.microsoft.com/office/drawing/2014/main" id="{DD88D5C6-313A-8C4E-8EB8-372596E870EF}"/>
+              </a:ext>
+            </a:extLst>
+          </p:cNvPr>
+          <p:cNvPicPr>
+            <a:picLocks noGrp="1" noChangeAspect="1"/>
+          </p:cNvPicPr>
           <p:nvPr>
             <p:ph idx="1"/>
           </p:nvPr>
-        </p:nvSpPr>
-        <p:spPr>
-          <a:xfrm>
-            <a:off x="838198" y="1825626"/>
-            <a:ext cx="10558496" cy="1686640"/>
-          </a:xfrm>
-        </p:spPr>
-        <p:txBody>
-          <a:bodyPr>
-            <a:normAutofit/>
-          </a:bodyPr>
-          <a:lstStyle/>
-          <a:p>
-            <a:pPr marL="514350" indent="-514350">
-              <a:buFont typeface="+mj-lt"/>
-              <a:buAutoNum type="arabicPeriod"/>
-            </a:pPr>
-            <a:r>
-              <a:rPr lang="cs-CZ" dirty="0"/>
-              <a:t>Nízké nároky na výpočetní paměť</a:t>
-            </a:r>
-          </a:p>
-          <a:p>
-            <a:pPr marL="514350" indent="-514350">
-              <a:buFont typeface="+mj-lt"/>
-              <a:buAutoNum type="arabicPeriod"/>
-            </a:pPr>
-            <a:r>
-              <a:rPr lang="cs-CZ" dirty="0"/>
-              <a:t>Zpracování mnohadimenzionálních dat bez další informace</a:t>
-            </a:r>
-          </a:p>
-          <a:p>
-            <a:pPr marL="514350" indent="-514350">
-              <a:buFont typeface="+mj-lt"/>
-              <a:buAutoNum type="arabicPeriod"/>
-            </a:pPr>
-            <a:r>
-              <a:rPr lang="cs-CZ" dirty="0"/>
-              <a:t>V </a:t>
-            </a:r>
-            <a:r>
-              <a:rPr lang="cs-CZ" dirty="0" err="1"/>
-              <a:t>trénovacích</a:t>
-            </a:r>
-            <a:r>
-              <a:rPr lang="cs-CZ" dirty="0"/>
-              <a:t> datech mohou nebo nemusejí být přítomny anomálie  </a:t>
-            </a:r>
-            <a:r>
-              <a:rPr lang="cs-CZ" b="1" dirty="0"/>
-              <a:t> </a:t>
-            </a:r>
-          </a:p>
-          <a:p>
-            <a:pPr marL="0" indent="0">
-              <a:buNone/>
-            </a:pPr>
-            <a:endParaRPr lang="cs-CZ" dirty="0"/>
-          </a:p>
-          <a:p>
-            <a:endParaRPr lang="cs-CZ" dirty="0"/>
-          </a:p>
-        </p:txBody>
-      </p:sp>
-      <mc:AlternateContent xmlns:mc="http://schemas.openxmlformats.org/markup-compatibility/2006" xmlns:a14="http://schemas.microsoft.com/office/drawing/2010/main">
-        <mc:Choice Requires="a14">
-          <p:sp>
-            <p:nvSpPr>
-              <p:cNvPr id="7" name="Zástupný obsah 3">
-                <a:extLst>
-                  <a:ext uri="{FF2B5EF4-FFF2-40B4-BE49-F238E27FC236}">
-                    <a16:creationId xmlns:a16="http://schemas.microsoft.com/office/drawing/2014/main" id="{C3B1F632-5AE7-744C-A914-C9340E4207E5}"/>
-                  </a:ext>
-                </a:extLst>
-              </p:cNvPr>
-              <p:cNvSpPr txBox="1">
-                <a:spLocks/>
-              </p:cNvSpPr>
-              <p:nvPr/>
-            </p:nvSpPr>
-            <p:spPr>
-              <a:xfrm>
-                <a:off x="2849898" y="4098890"/>
-                <a:ext cx="6636254" cy="1096068"/>
-              </a:xfrm>
-              <a:prstGeom prst="rect">
-                <a:avLst/>
-              </a:prstGeom>
-            </p:spPr>
-            <p:style>
-              <a:lnRef idx="2">
-                <a:schemeClr val="dk1"/>
-              </a:lnRef>
-              <a:fillRef idx="1">
-                <a:schemeClr val="lt1"/>
-              </a:fillRef>
-              <a:effectRef idx="0">
-                <a:schemeClr val="dk1"/>
-              </a:effectRef>
-              <a:fontRef idx="minor">
-                <a:schemeClr val="dk1"/>
-              </a:fontRef>
-            </p:style>
-            <p:txBody>
-              <a:bodyPr vert="horz" lIns="91440" tIns="108000" rIns="91440" bIns="36000" rtlCol="0">
-                <a:normAutofit/>
-              </a:bodyPr>
-              <a:lstStyle>
-                <a:lvl1pPr marL="228600" indent="-228600" algn="l" defTabSz="914400" rtl="0" eaLnBrk="1" latinLnBrk="0" hangingPunct="1">
-                  <a:lnSpc>
-                    <a:spcPct val="90000"/>
-                  </a:lnSpc>
-                  <a:spcBef>
-                    <a:spcPts val="1000"/>
-                  </a:spcBef>
-                  <a:buFont typeface="Arial" panose="020B0604020202020204" pitchFamily="34" charset="0"/>
-                  <a:buChar char="•"/>
-                  <a:defRPr sz="2800" kern="1200">
-                    <a:solidFill>
-                      <a:schemeClr val="tx1"/>
-                    </a:solidFill>
-                    <a:latin typeface="+mn-lt"/>
-                    <a:ea typeface="+mn-ea"/>
-                    <a:cs typeface="+mn-cs"/>
-                  </a:defRPr>
-                </a:lvl1pPr>
-                <a:lvl2pPr marL="685800" indent="-228600" algn="l" defTabSz="914400" rtl="0" eaLnBrk="1" latinLnBrk="0" hangingPunct="1">
-                  <a:lnSpc>
-                    <a:spcPct val="90000"/>
-                  </a:lnSpc>
-                  <a:spcBef>
-                    <a:spcPts val="500"/>
-                  </a:spcBef>
-                  <a:buFont typeface="Arial" panose="020B0604020202020204" pitchFamily="34" charset="0"/>
-                  <a:buChar char="•"/>
-                  <a:defRPr sz="2400" kern="1200">
-                    <a:solidFill>
-                      <a:schemeClr val="tx1"/>
-                    </a:solidFill>
-                    <a:latin typeface="+mn-lt"/>
-                    <a:ea typeface="+mn-ea"/>
-                    <a:cs typeface="+mn-cs"/>
-                  </a:defRPr>
-                </a:lvl2pPr>
-                <a:lvl3pPr marL="1143000" indent="-228600" algn="l" defTabSz="914400" rtl="0" eaLnBrk="1" latinLnBrk="0" hangingPunct="1">
-                  <a:lnSpc>
-                    <a:spcPct val="90000"/>
-                  </a:lnSpc>
-                  <a:spcBef>
-                    <a:spcPts val="500"/>
-                  </a:spcBef>
-                  <a:buFont typeface="Arial" panose="020B0604020202020204" pitchFamily="34" charset="0"/>
-                  <a:buChar char="•"/>
-                  <a:defRPr sz="2000" kern="1200">
-                    <a:solidFill>
-                      <a:schemeClr val="tx1"/>
-                    </a:solidFill>
-                    <a:latin typeface="+mn-lt"/>
-                    <a:ea typeface="+mn-ea"/>
-                    <a:cs typeface="+mn-cs"/>
-                  </a:defRPr>
-                </a:lvl3pPr>
-                <a:lvl4pPr marL="1600200" indent="-228600" algn="l" defTabSz="914400" rtl="0" eaLnBrk="1" latinLnBrk="0" hangingPunct="1">
-                  <a:lnSpc>
-                    <a:spcPct val="90000"/>
-                  </a:lnSpc>
-                  <a:spcBef>
-                    <a:spcPts val="500"/>
-                  </a:spcBef>
-                  <a:buFont typeface="Arial" panose="020B0604020202020204" pitchFamily="34" charset="0"/>
-                  <a:buChar char="•"/>
-                  <a:defRPr sz="1800" kern="1200">
-                    <a:solidFill>
-                      <a:schemeClr val="tx1"/>
-                    </a:solidFill>
-                    <a:latin typeface="+mn-lt"/>
-                    <a:ea typeface="+mn-ea"/>
-                    <a:cs typeface="+mn-cs"/>
-                  </a:defRPr>
-                </a:lvl4pPr>
-                <a:lvl5pPr marL="2057400" indent="-228600" algn="l" defTabSz="914400" rtl="0" eaLnBrk="1" latinLnBrk="0" hangingPunct="1">
-                  <a:lnSpc>
-                    <a:spcPct val="90000"/>
-                  </a:lnSpc>
-                  <a:spcBef>
-                    <a:spcPts val="500"/>
-                  </a:spcBef>
-                  <a:buFont typeface="Arial" panose="020B0604020202020204" pitchFamily="34" charset="0"/>
-                  <a:buChar char="•"/>
-                  <a:defRPr sz="1800" kern="1200">
-                    <a:solidFill>
-                      <a:schemeClr val="tx1"/>
-                    </a:solidFill>
-                    <a:latin typeface="+mn-lt"/>
-                    <a:ea typeface="+mn-ea"/>
-                    <a:cs typeface="+mn-cs"/>
-                  </a:defRPr>
-                </a:lvl5pPr>
-                <a:lvl6pPr marL="2514600" indent="-228600" algn="l" defTabSz="914400" rtl="0" eaLnBrk="1" latinLnBrk="0" hangingPunct="1">
-                  <a:lnSpc>
-                    <a:spcPct val="90000"/>
-                  </a:lnSpc>
-                  <a:spcBef>
-                    <a:spcPts val="500"/>
-                  </a:spcBef>
-                  <a:buFont typeface="Arial" panose="020B0604020202020204" pitchFamily="34" charset="0"/>
-                  <a:buChar char="•"/>
-                  <a:defRPr sz="1800" kern="1200">
-                    <a:solidFill>
-                      <a:schemeClr val="tx1"/>
-                    </a:solidFill>
-                    <a:latin typeface="+mn-lt"/>
-                    <a:ea typeface="+mn-ea"/>
-                    <a:cs typeface="+mn-cs"/>
-                  </a:defRPr>
-                </a:lvl6pPr>
-                <a:lvl7pPr marL="2971800" indent="-228600" algn="l" defTabSz="914400" rtl="0" eaLnBrk="1" latinLnBrk="0" hangingPunct="1">
-                  <a:lnSpc>
-                    <a:spcPct val="90000"/>
-                  </a:lnSpc>
-                  <a:spcBef>
-                    <a:spcPts val="500"/>
-                  </a:spcBef>
-                  <a:buFont typeface="Arial" panose="020B0604020202020204" pitchFamily="34" charset="0"/>
-                  <a:buChar char="•"/>
-                  <a:defRPr sz="1800" kern="1200">
-                    <a:solidFill>
-                      <a:schemeClr val="tx1"/>
-                    </a:solidFill>
-                    <a:latin typeface="+mn-lt"/>
-                    <a:ea typeface="+mn-ea"/>
-                    <a:cs typeface="+mn-cs"/>
-                  </a:defRPr>
-                </a:lvl7pPr>
-                <a:lvl8pPr marL="3429000" indent="-228600" algn="l" defTabSz="914400" rtl="0" eaLnBrk="1" latinLnBrk="0" hangingPunct="1">
-                  <a:lnSpc>
-                    <a:spcPct val="90000"/>
-                  </a:lnSpc>
-                  <a:spcBef>
-                    <a:spcPts val="500"/>
-                  </a:spcBef>
-                  <a:buFont typeface="Arial" panose="020B0604020202020204" pitchFamily="34" charset="0"/>
-                  <a:buChar char="•"/>
-                  <a:defRPr sz="1800" kern="1200">
-                    <a:solidFill>
-                      <a:schemeClr val="tx1"/>
-                    </a:solidFill>
-                    <a:latin typeface="+mn-lt"/>
-                    <a:ea typeface="+mn-ea"/>
-                    <a:cs typeface="+mn-cs"/>
-                  </a:defRPr>
-                </a:lvl8pPr>
-                <a:lvl9pPr marL="3886200" indent="-228600" algn="l" defTabSz="914400" rtl="0" eaLnBrk="1" latinLnBrk="0" hangingPunct="1">
-                  <a:lnSpc>
-                    <a:spcPct val="90000"/>
-                  </a:lnSpc>
-                  <a:spcBef>
-                    <a:spcPts val="500"/>
-                  </a:spcBef>
-                  <a:buFont typeface="Arial" panose="020B0604020202020204" pitchFamily="34" charset="0"/>
-                  <a:buChar char="•"/>
-                  <a:defRPr sz="1800" kern="1200">
-                    <a:solidFill>
-                      <a:schemeClr val="tx1"/>
-                    </a:solidFill>
-                    <a:latin typeface="+mn-lt"/>
-                    <a:ea typeface="+mn-ea"/>
-                    <a:cs typeface="+mn-cs"/>
-                  </a:defRPr>
-                </a:lvl9pPr>
-              </a:lstStyle>
-              <a:p>
-                <a:pPr marL="0" indent="0">
-                  <a:buFont typeface="Arial" panose="020B0604020202020204" pitchFamily="34" charset="0"/>
-                  <a:buNone/>
-                </a:pPr>
-                <a14:m>
-                  <m:oMathPara xmlns:m="http://schemas.openxmlformats.org/officeDocument/2006/math">
-                    <m:oMathParaPr>
-                      <m:jc m:val="left"/>
-                    </m:oMathParaPr>
-                    <m:oMath xmlns:m="http://schemas.openxmlformats.org/officeDocument/2006/math">
-                      <m:r>
-                        <a:rPr lang="cs-CZ" i="1" smtClean="0">
-                          <a:latin typeface="Cambria Math" panose="02040503050406030204" pitchFamily="18" charset="0"/>
-                        </a:rPr>
-                        <m:t>𝑓</m:t>
-                      </m:r>
-                      <m:d>
-                        <m:dPr>
-                          <m:ctrlPr>
-                            <a:rPr lang="cs-CZ" i="1" smtClean="0">
-                              <a:latin typeface="Cambria Math" panose="02040503050406030204" pitchFamily="18" charset="0"/>
-                            </a:rPr>
-                          </m:ctrlPr>
-                        </m:dPr>
-                        <m:e>
-                          <m:r>
-                            <a:rPr lang="cs-CZ" i="1" smtClean="0">
-                              <a:latin typeface="Cambria Math" panose="02040503050406030204" pitchFamily="18" charset="0"/>
-                            </a:rPr>
-                            <m:t>𝑥</m:t>
-                          </m:r>
-                        </m:e>
-                      </m:d>
-                      <m:r>
-                        <a:rPr lang="cs-CZ" i="1" smtClean="0">
-                          <a:latin typeface="Cambria Math" panose="02040503050406030204" pitchFamily="18" charset="0"/>
-                        </a:rPr>
-                        <m:t>=</m:t>
-                      </m:r>
-                      <m:d>
-                        <m:dPr>
-                          <m:begChr m:val="{"/>
-                          <m:endChr m:val=""/>
-                          <m:ctrlPr>
-                            <a:rPr lang="cs-CZ" i="1" smtClean="0">
-                              <a:latin typeface="Cambria Math" panose="02040503050406030204" pitchFamily="18" charset="0"/>
-                            </a:rPr>
-                          </m:ctrlPr>
-                        </m:dPr>
-                        <m:e>
-                          <m:eqArr>
-                            <m:eqArrPr>
-                              <m:ctrlPr>
-                                <a:rPr lang="cs-CZ" i="1" smtClean="0">
-                                  <a:latin typeface="Cambria Math" panose="02040503050406030204" pitchFamily="18" charset="0"/>
-                                </a:rPr>
-                              </m:ctrlPr>
-                            </m:eqArrPr>
-                            <m:e>
-                              <m:r>
-                                <a:rPr lang="cs-CZ" i="1" smtClean="0">
-                                  <a:latin typeface="Cambria Math" panose="02040503050406030204" pitchFamily="18" charset="0"/>
-                                </a:rPr>
-                                <m:t>1 </m:t>
-                              </m:r>
-                              <m:d>
-                                <m:dPr>
-                                  <m:ctrlPr>
-                                    <a:rPr lang="cs-CZ" i="1" smtClean="0">
-                                      <a:latin typeface="Cambria Math" panose="02040503050406030204" pitchFamily="18" charset="0"/>
-                                    </a:rPr>
-                                  </m:ctrlPr>
-                                </m:dPr>
-                                <m:e>
-                                  <m:r>
-                                    <a:rPr lang="cs-CZ" i="1" smtClean="0">
-                                      <a:latin typeface="Cambria Math" panose="02040503050406030204" pitchFamily="18" charset="0"/>
-                                    </a:rPr>
-                                    <m:t>𝑠𝑎𝑚𝑝𝑙𝑒</m:t>
-                                  </m:r>
-                                  <m:r>
-                                    <a:rPr lang="cs-CZ" i="1" smtClean="0">
-                                      <a:latin typeface="Cambria Math" panose="02040503050406030204" pitchFamily="18" charset="0"/>
-                                    </a:rPr>
-                                    <m:t> </m:t>
-                                  </m:r>
-                                  <m:r>
-                                    <a:rPr lang="cs-CZ" i="1" smtClean="0">
-                                      <a:latin typeface="Cambria Math" panose="02040503050406030204" pitchFamily="18" charset="0"/>
-                                    </a:rPr>
-                                    <m:t>𝑜𝑘</m:t>
-                                  </m:r>
-                                </m:e>
-                              </m:d>
-                              <m:r>
-                                <a:rPr lang="cs-CZ" i="1" smtClean="0">
-                                  <a:latin typeface="Cambria Math" panose="02040503050406030204" pitchFamily="18" charset="0"/>
-                                </a:rPr>
-                                <m:t>,  </m:t>
-                              </m:r>
-                              <m:r>
-                                <a:rPr lang="cs-CZ" smtClean="0">
-                                  <a:latin typeface="Cambria Math" panose="02040503050406030204" pitchFamily="18" charset="0"/>
-                                </a:rPr>
-                                <m:t>          </m:t>
-                              </m:r>
-                              <m:r>
-                                <m:rPr>
-                                  <m:sty m:val="p"/>
-                                </m:rPr>
-                                <a:rPr lang="cs-CZ" smtClean="0">
-                                  <a:latin typeface="Cambria Math" panose="02040503050406030204" pitchFamily="18" charset="0"/>
-                                </a:rPr>
-                                <m:t>IF</m:t>
-                              </m:r>
-                              <m:r>
-                                <a:rPr lang="cs-CZ" i="1" smtClean="0">
-                                  <a:latin typeface="Cambria Math" panose="02040503050406030204" pitchFamily="18" charset="0"/>
-                                </a:rPr>
-                                <m:t> </m:t>
-                              </m:r>
-                              <m:r>
-                                <a:rPr lang="cs-CZ" i="1" smtClean="0">
-                                  <a:latin typeface="Cambria Math" panose="02040503050406030204" pitchFamily="18" charset="0"/>
-                                </a:rPr>
-                                <m:t>𝑆</m:t>
-                              </m:r>
-                              <m:r>
-                                <a:rPr lang="cs-CZ" i="1" smtClean="0">
-                                  <a:latin typeface="Cambria Math" panose="02040503050406030204" pitchFamily="18" charset="0"/>
-                                </a:rPr>
-                                <m:t>&gt;0</m:t>
-                              </m:r>
-                            </m:e>
-                            <m:e>
-                              <m:r>
-                                <a:rPr lang="cs-CZ" i="1" smtClean="0">
-                                  <a:latin typeface="Cambria Math" panose="02040503050406030204" pitchFamily="18" charset="0"/>
-                                </a:rPr>
-                                <m:t>&amp;0 (</m:t>
-                              </m:r>
-                              <m:r>
-                                <a:rPr lang="cs-CZ" i="1" smtClean="0">
-                                  <a:latin typeface="Cambria Math" panose="02040503050406030204" pitchFamily="18" charset="0"/>
-                                </a:rPr>
-                                <m:t>𝑠𝑎𝑚𝑝𝑙𝑒</m:t>
-                              </m:r>
-                              <m:r>
-                                <a:rPr lang="cs-CZ" i="1" smtClean="0">
-                                  <a:latin typeface="Cambria Math" panose="02040503050406030204" pitchFamily="18" charset="0"/>
-                                </a:rPr>
-                                <m:t> </m:t>
-                              </m:r>
-                              <m:r>
-                                <a:rPr lang="cs-CZ" i="1" smtClean="0">
-                                  <a:latin typeface="Cambria Math" panose="02040503050406030204" pitchFamily="18" charset="0"/>
-                                </a:rPr>
-                                <m:t>𝑜𝑢𝑡𝑙𝑖𝑒𝑟</m:t>
-                              </m:r>
-                              <m:r>
-                                <a:rPr lang="cs-CZ" i="1" smtClean="0">
-                                  <a:latin typeface="Cambria Math" panose="02040503050406030204" pitchFamily="18" charset="0"/>
-                                </a:rPr>
-                                <m:t>),  </m:t>
-                              </m:r>
-                              <m:r>
-                                <a:rPr lang="cs-CZ" b="0" i="0" smtClean="0">
-                                  <a:latin typeface="Cambria Math" panose="02040503050406030204" pitchFamily="18" charset="0"/>
-                                </a:rPr>
-                                <m:t> </m:t>
-                              </m:r>
-                              <m:r>
-                                <m:rPr>
-                                  <m:sty m:val="p"/>
-                                </m:rPr>
-                                <a:rPr lang="cs-CZ" smtClean="0">
-                                  <a:latin typeface="Cambria Math" panose="02040503050406030204" pitchFamily="18" charset="0"/>
-                                </a:rPr>
-                                <m:t>IF</m:t>
-                              </m:r>
-                              <m:r>
-                                <a:rPr lang="cs-CZ" smtClean="0">
-                                  <a:latin typeface="Cambria Math" panose="02040503050406030204" pitchFamily="18" charset="0"/>
-                                </a:rPr>
-                                <m:t> </m:t>
-                              </m:r>
-                              <m:r>
-                                <a:rPr lang="cs-CZ" i="1" smtClean="0">
-                                  <a:latin typeface="Cambria Math" panose="02040503050406030204" pitchFamily="18" charset="0"/>
-                                </a:rPr>
-                                <m:t>𝑆</m:t>
-                              </m:r>
-                              <m:r>
-                                <a:rPr lang="cs-CZ" i="1">
-                                  <a:latin typeface="Cambria Math" panose="02040503050406030204" pitchFamily="18" charset="0"/>
-                                  <a:ea typeface="Cambria Math" panose="02040503050406030204" pitchFamily="18" charset="0"/>
-                                </a:rPr>
-                                <m:t>≤</m:t>
-                              </m:r>
-                              <m:r>
-                                <a:rPr lang="cs-CZ" i="1" smtClean="0">
-                                  <a:latin typeface="Cambria Math" panose="02040503050406030204" pitchFamily="18" charset="0"/>
-                                </a:rPr>
-                                <m:t>0</m:t>
-                              </m:r>
-                            </m:e>
-                          </m:eqArr>
-                        </m:e>
-                      </m:d>
-                    </m:oMath>
-                  </m:oMathPara>
-                </a14:m>
-                <a:endParaRPr lang="cs-CZ" dirty="0"/>
-              </a:p>
-            </p:txBody>
-          </p:sp>
-        </mc:Choice>
-        <mc:Fallback xmlns="">
-          <p:sp>
-            <p:nvSpPr>
-              <p:cNvPr id="7" name="Zástupný obsah 3">
-                <a:extLst>
-                  <a:ext uri="{FF2B5EF4-FFF2-40B4-BE49-F238E27FC236}">
-                    <a16:creationId xmlns:a16="http://schemas.microsoft.com/office/drawing/2014/main" id="{C3B1F632-5AE7-744C-A914-C9340E4207E5}"/>
-                  </a:ext>
-                </a:extLst>
-              </p:cNvPr>
-              <p:cNvSpPr txBox="1">
-                <a:spLocks noRot="1" noChangeAspect="1" noMove="1" noResize="1" noEditPoints="1" noAdjustHandles="1" noChangeArrowheads="1" noChangeShapeType="1" noTextEdit="1"/>
-              </p:cNvSpPr>
-              <p:nvPr/>
-            </p:nvSpPr>
-            <p:spPr>
-              <a:xfrm>
-                <a:off x="2849898" y="4098890"/>
-                <a:ext cx="6636254" cy="1096068"/>
-              </a:xfrm>
-              <a:prstGeom prst="rect">
-                <a:avLst/>
-              </a:prstGeom>
-              <a:blipFill>
-                <a:blip r:embed="rId2"/>
-                <a:stretch>
-                  <a:fillRect l="-8190" t="-192045" b="-272727"/>
-                </a:stretch>
-              </a:blipFill>
-            </p:spPr>
-            <p:txBody>
-              <a:bodyPr/>
-              <a:lstStyle/>
-              <a:p>
-                <a:r>
-                  <a:rPr lang="cs-CZ">
-                    <a:noFill/>
-                  </a:rPr>
-                  <a:t> </a:t>
-                </a:r>
-              </a:p>
-            </p:txBody>
-          </p:sp>
-        </mc:Fallback>
-      </mc:AlternateContent>
+        </p:nvPicPr>
+        <p:blipFill>
+          <a:blip r:embed="rId2"/>
+          <a:stretch>
+            <a:fillRect/>
+          </a:stretch>
+        </p:blipFill>
+        <p:spPr>
+          <a:xfrm>
+            <a:off x="349435" y="1655358"/>
+            <a:ext cx="5624999" cy="4500000"/>
+          </a:xfrm>
+        </p:spPr>
+      </p:pic>
+      <p:pic>
+        <p:nvPicPr>
+          <p:cNvPr id="10" name="Obrázek 9" descr="Obsah obrázku snímek obrazovky&#10;&#10;Popis byl vytvořen automaticky">
+            <a:extLst>
+              <a:ext uri="{FF2B5EF4-FFF2-40B4-BE49-F238E27FC236}">
+                <a16:creationId xmlns:a16="http://schemas.microsoft.com/office/drawing/2014/main" id="{4DA9AF51-A7EF-3848-A9F3-EE8DE1DEC437}"/>
+              </a:ext>
+            </a:extLst>
+          </p:cNvPr>
+          <p:cNvPicPr>
+            <a:picLocks noChangeAspect="1"/>
+          </p:cNvPicPr>
+          <p:nvPr/>
+        </p:nvPicPr>
+        <p:blipFill>
+          <a:blip r:embed="rId3"/>
+          <a:stretch>
+            <a:fillRect/>
+          </a:stretch>
+        </p:blipFill>
+        <p:spPr>
+          <a:xfrm>
+            <a:off x="6350349" y="1655358"/>
+            <a:ext cx="5625000" cy="4500000"/>
+          </a:xfrm>
+          <a:prstGeom prst="rect">
+            <a:avLst/>
+          </a:prstGeom>
+        </p:spPr>
+      </p:pic>
     </p:spTree>
     <p:extLst>
       <p:ext uri="{BB962C8B-B14F-4D97-AF65-F5344CB8AC3E}">
-        <p14:creationId xmlns:p14="http://schemas.microsoft.com/office/powerpoint/2010/main" val="1130124419"/>
+        <p14:creationId xmlns:p14="http://schemas.microsoft.com/office/powerpoint/2010/main" val="749297666"/>
       </p:ext>
     </p:extLst>
   </p:cSld>

</xml_diff>